<commit_message>
Try xgboost and ridge regression model + cleanup of code
</commit_message>
<xml_diff>
--- a/reports/Natural Cycles - Assignment Report - Jeroen Buil.pptx
+++ b/reports/Natural Cycles - Assignment Report - Jeroen Buil.pptx
@@ -148,7 +148,7 @@
       </p:grpSpPr>
       <p:sp>
         <p:nvSpPr>
-          <p:cNvPr id="887342283" name="Header Placeholder 1"/>
+          <p:cNvPr id="639707234" name="Header Placeholder 1"/>
           <p:cNvSpPr>
             <a:spLocks noGrp="1"/>
           </p:cNvSpPr>
@@ -182,7 +182,7 @@
       </p:sp>
       <p:sp>
         <p:nvSpPr>
-          <p:cNvPr id="544905076" name="Date Placeholder 2"/>
+          <p:cNvPr id="1677912674" name="Date Placeholder 2"/>
           <p:cNvSpPr>
             <a:spLocks noGrp="1"/>
           </p:cNvSpPr>
@@ -220,7 +220,7 @@
       </p:sp>
       <p:sp>
         <p:nvSpPr>
-          <p:cNvPr id="16901425" name="Slide Image Placeholder 3"/>
+          <p:cNvPr id="593464996" name="Slide Image Placeholder 3"/>
           <p:cNvSpPr>
             <a:spLocks noChangeAspect="1" noGrp="1" noRot="1"/>
           </p:cNvSpPr>
@@ -256,7 +256,7 @@
       </p:sp>
       <p:sp>
         <p:nvSpPr>
-          <p:cNvPr id="204355641" name="Notes Placeholder 4"/>
+          <p:cNvPr id="1735553210" name="Notes Placeholder 4"/>
           <p:cNvSpPr>
             <a:spLocks noGrp="1"/>
           </p:cNvSpPr>
@@ -330,7 +330,7 @@
       </p:sp>
       <p:sp>
         <p:nvSpPr>
-          <p:cNvPr id="2008946156" name="Footer Placeholder 5"/>
+          <p:cNvPr id="383383786" name="Footer Placeholder 5"/>
           <p:cNvSpPr>
             <a:spLocks noGrp="1"/>
           </p:cNvSpPr>
@@ -364,7 +364,7 @@
       </p:sp>
       <p:sp>
         <p:nvSpPr>
-          <p:cNvPr id="1619853287" name="Slide Number Placeholder 6"/>
+          <p:cNvPr id="983638068" name="Slide Number Placeholder 6"/>
           <p:cNvSpPr>
             <a:spLocks noGrp="1"/>
           </p:cNvSpPr>
@@ -517,7 +517,7 @@
       </p:grpSpPr>
       <p:sp>
         <p:nvSpPr>
-          <p:cNvPr id="120447029" name="Slide Image Placeholder 1"/>
+          <p:cNvPr id="205695033" name="Slide Image Placeholder 1"/>
           <p:cNvSpPr>
             <a:spLocks noChangeAspect="1" noGrp="1" noRot="1"/>
           </p:cNvSpPr>
@@ -534,7 +534,7 @@
       </p:sp>
       <p:sp>
         <p:nvSpPr>
-          <p:cNvPr id="889137198" name="Notes Placeholder 2"/>
+          <p:cNvPr id="1066446428" name="Notes Placeholder 2"/>
           <p:cNvSpPr>
             <a:spLocks noGrp="1"/>
           </p:cNvSpPr>
@@ -559,7 +559,7 @@
       </p:sp>
       <p:sp>
         <p:nvSpPr>
-          <p:cNvPr id="903702218" name="Slide Number Placeholder 3"/>
+          <p:cNvPr id="1784792487" name="Slide Number Placeholder 3"/>
           <p:cNvSpPr>
             <a:spLocks noGrp="1"/>
           </p:cNvSpPr>
@@ -1800,7 +1800,7 @@
       </p:grpSpPr>
       <p:sp>
         <p:nvSpPr>
-          <p:cNvPr id="1876486804" name="Title 1"/>
+          <p:cNvPr id="1342571574" name="Title 1"/>
           <p:cNvSpPr>
             <a:spLocks noGrp="1"/>
           </p:cNvSpPr>
@@ -1835,7 +1835,7 @@
       </p:sp>
       <p:sp>
         <p:nvSpPr>
-          <p:cNvPr id="793120299" name="Subtitle 2"/>
+          <p:cNvPr id="1896747816" name="Subtitle 2"/>
           <p:cNvSpPr>
             <a:spLocks noGrp="1"/>
           </p:cNvSpPr>
@@ -1903,7 +1903,7 @@
       </p:sp>
       <p:sp>
         <p:nvSpPr>
-          <p:cNvPr id="1045929651" name="Date Placeholder 3"/>
+          <p:cNvPr id="821489894" name="Date Placeholder 3"/>
           <p:cNvSpPr>
             <a:spLocks noGrp="1"/>
           </p:cNvSpPr>
@@ -1929,7 +1929,7 @@
       </p:sp>
       <p:sp>
         <p:nvSpPr>
-          <p:cNvPr id="60037219" name="Footer Placeholder 4"/>
+          <p:cNvPr id="1040326216" name="Footer Placeholder 4"/>
           <p:cNvSpPr>
             <a:spLocks noGrp="1"/>
           </p:cNvSpPr>
@@ -1951,7 +1951,7 @@
       </p:sp>
       <p:sp>
         <p:nvSpPr>
-          <p:cNvPr id="857121560" name="Slide Number Placeholder 5"/>
+          <p:cNvPr id="1799631588" name="Slide Number Placeholder 5"/>
           <p:cNvSpPr>
             <a:spLocks noGrp="1"/>
           </p:cNvSpPr>
@@ -2002,7 +2002,7 @@
       </p:grpSpPr>
       <p:sp>
         <p:nvSpPr>
-          <p:cNvPr id="278766004" name="Title 1"/>
+          <p:cNvPr id="909151071" name="Title 1"/>
           <p:cNvSpPr>
             <a:spLocks noGrp="1"/>
           </p:cNvSpPr>
@@ -2028,7 +2028,7 @@
       </p:sp>
       <p:sp>
         <p:nvSpPr>
-          <p:cNvPr id="929221550" name="Vertical Text Placeholder 2"/>
+          <p:cNvPr id="735972001" name="Vertical Text Placeholder 2"/>
           <p:cNvSpPr>
             <a:spLocks noGrp="1"/>
           </p:cNvSpPr>
@@ -2094,7 +2094,7 @@
       </p:sp>
       <p:sp>
         <p:nvSpPr>
-          <p:cNvPr id="1107792039" name="Date Placeholder 3"/>
+          <p:cNvPr id="155629598" name="Date Placeholder 3"/>
           <p:cNvSpPr>
             <a:spLocks noGrp="1"/>
           </p:cNvSpPr>
@@ -2120,7 +2120,7 @@
       </p:sp>
       <p:sp>
         <p:nvSpPr>
-          <p:cNvPr id="1777957079" name="Footer Placeholder 4"/>
+          <p:cNvPr id="402781289" name="Footer Placeholder 4"/>
           <p:cNvSpPr>
             <a:spLocks noGrp="1"/>
           </p:cNvSpPr>
@@ -2142,7 +2142,7 @@
       </p:sp>
       <p:sp>
         <p:nvSpPr>
-          <p:cNvPr id="1049848110" name="Slide Number Placeholder 5"/>
+          <p:cNvPr id="63216115" name="Slide Number Placeholder 5"/>
           <p:cNvSpPr>
             <a:spLocks noGrp="1"/>
           </p:cNvSpPr>
@@ -2193,7 +2193,7 @@
       </p:grpSpPr>
       <p:sp>
         <p:nvSpPr>
-          <p:cNvPr id="194292146" name="Vertical Title 1"/>
+          <p:cNvPr id="370147172" name="Vertical Title 1"/>
           <p:cNvSpPr>
             <a:spLocks noGrp="1"/>
           </p:cNvSpPr>
@@ -2224,7 +2224,7 @@
       </p:sp>
       <p:sp>
         <p:nvSpPr>
-          <p:cNvPr id="1433028487" name="Vertical Text Placeholder 2"/>
+          <p:cNvPr id="751398947" name="Vertical Text Placeholder 2"/>
           <p:cNvSpPr>
             <a:spLocks noGrp="1"/>
           </p:cNvSpPr>
@@ -2295,7 +2295,7 @@
       </p:sp>
       <p:sp>
         <p:nvSpPr>
-          <p:cNvPr id="817993928" name="Date Placeholder 3"/>
+          <p:cNvPr id="1747834350" name="Date Placeholder 3"/>
           <p:cNvSpPr>
             <a:spLocks noGrp="1"/>
           </p:cNvSpPr>
@@ -2321,7 +2321,7 @@
       </p:sp>
       <p:sp>
         <p:nvSpPr>
-          <p:cNvPr id="1954296984" name="Footer Placeholder 4"/>
+          <p:cNvPr id="1929735194" name="Footer Placeholder 4"/>
           <p:cNvSpPr>
             <a:spLocks noGrp="1"/>
           </p:cNvSpPr>
@@ -2343,7 +2343,7 @@
       </p:sp>
       <p:sp>
         <p:nvSpPr>
-          <p:cNvPr id="161568207" name="Slide Number Placeholder 5"/>
+          <p:cNvPr id="281501605" name="Slide Number Placeholder 5"/>
           <p:cNvSpPr>
             <a:spLocks noGrp="1"/>
           </p:cNvSpPr>
@@ -2394,7 +2394,7 @@
       </p:grpSpPr>
       <p:sp>
         <p:nvSpPr>
-          <p:cNvPr id="1670023491" name="Title 1"/>
+          <p:cNvPr id="1832186409" name="Title 1"/>
           <p:cNvSpPr>
             <a:spLocks noGrp="1"/>
           </p:cNvSpPr>
@@ -2420,7 +2420,7 @@
       </p:sp>
       <p:sp>
         <p:nvSpPr>
-          <p:cNvPr id="1443672775" name="Content Placeholder 2"/>
+          <p:cNvPr id="1157076185" name="Content Placeholder 2"/>
           <p:cNvSpPr>
             <a:spLocks noGrp="1"/>
           </p:cNvSpPr>
@@ -2486,7 +2486,7 @@
       </p:sp>
       <p:sp>
         <p:nvSpPr>
-          <p:cNvPr id="452059515" name="Date Placeholder 3"/>
+          <p:cNvPr id="926142532" name="Date Placeholder 3"/>
           <p:cNvSpPr>
             <a:spLocks noGrp="1"/>
           </p:cNvSpPr>
@@ -2512,7 +2512,7 @@
       </p:sp>
       <p:sp>
         <p:nvSpPr>
-          <p:cNvPr id="59352746" name="Footer Placeholder 4"/>
+          <p:cNvPr id="1633925034" name="Footer Placeholder 4"/>
           <p:cNvSpPr>
             <a:spLocks noGrp="1"/>
           </p:cNvSpPr>
@@ -2534,7 +2534,7 @@
       </p:sp>
       <p:sp>
         <p:nvSpPr>
-          <p:cNvPr id="1523189800" name="Slide Number Placeholder 5"/>
+          <p:cNvPr id="1077719219" name="Slide Number Placeholder 5"/>
           <p:cNvSpPr>
             <a:spLocks noGrp="1"/>
           </p:cNvSpPr>
@@ -2585,7 +2585,7 @@
       </p:grpSpPr>
       <p:sp>
         <p:nvSpPr>
-          <p:cNvPr id="331522051" name="Title 1"/>
+          <p:cNvPr id="249394411" name="Title 1"/>
           <p:cNvSpPr>
             <a:spLocks noGrp="1"/>
           </p:cNvSpPr>
@@ -2620,7 +2620,7 @@
       </p:sp>
       <p:sp>
         <p:nvSpPr>
-          <p:cNvPr id="1792211101" name="Text Placeholder 2"/>
+          <p:cNvPr id="1093346641" name="Text Placeholder 2"/>
           <p:cNvSpPr>
             <a:spLocks noGrp="1"/>
           </p:cNvSpPr>
@@ -2742,7 +2742,7 @@
       </p:sp>
       <p:sp>
         <p:nvSpPr>
-          <p:cNvPr id="737894001" name="Date Placeholder 3"/>
+          <p:cNvPr id="106590094" name="Date Placeholder 3"/>
           <p:cNvSpPr>
             <a:spLocks noGrp="1"/>
           </p:cNvSpPr>
@@ -2768,7 +2768,7 @@
       </p:sp>
       <p:sp>
         <p:nvSpPr>
-          <p:cNvPr id="74035802" name="Footer Placeholder 4"/>
+          <p:cNvPr id="587033629" name="Footer Placeholder 4"/>
           <p:cNvSpPr>
             <a:spLocks noGrp="1"/>
           </p:cNvSpPr>
@@ -2790,7 +2790,7 @@
       </p:sp>
       <p:sp>
         <p:nvSpPr>
-          <p:cNvPr id="1445224517" name="Slide Number Placeholder 5"/>
+          <p:cNvPr id="382403844" name="Slide Number Placeholder 5"/>
           <p:cNvSpPr>
             <a:spLocks noGrp="1"/>
           </p:cNvSpPr>
@@ -2841,7 +2841,7 @@
       </p:grpSpPr>
       <p:sp>
         <p:nvSpPr>
-          <p:cNvPr id="62176343" name="Title 1"/>
+          <p:cNvPr id="1186138846" name="Title 1"/>
           <p:cNvSpPr>
             <a:spLocks noGrp="1"/>
           </p:cNvSpPr>
@@ -2867,7 +2867,7 @@
       </p:sp>
       <p:sp>
         <p:nvSpPr>
-          <p:cNvPr id="30768486" name="Content Placeholder 2"/>
+          <p:cNvPr id="649901613" name="Content Placeholder 2"/>
           <p:cNvSpPr>
             <a:spLocks noGrp="1"/>
           </p:cNvSpPr>
@@ -2938,7 +2938,7 @@
       </p:sp>
       <p:sp>
         <p:nvSpPr>
-          <p:cNvPr id="1727630725" name="Content Placeholder 3"/>
+          <p:cNvPr id="146870747" name="Content Placeholder 3"/>
           <p:cNvSpPr>
             <a:spLocks noGrp="1"/>
           </p:cNvSpPr>
@@ -3009,7 +3009,7 @@
       </p:sp>
       <p:sp>
         <p:nvSpPr>
-          <p:cNvPr id="1228600754" name="Date Placeholder 4"/>
+          <p:cNvPr id="1332766991" name="Date Placeholder 4"/>
           <p:cNvSpPr>
             <a:spLocks noGrp="1"/>
           </p:cNvSpPr>
@@ -3035,7 +3035,7 @@
       </p:sp>
       <p:sp>
         <p:nvSpPr>
-          <p:cNvPr id="1536054815" name="Footer Placeholder 5"/>
+          <p:cNvPr id="24809298" name="Footer Placeholder 5"/>
           <p:cNvSpPr>
             <a:spLocks noGrp="1"/>
           </p:cNvSpPr>
@@ -3057,7 +3057,7 @@
       </p:sp>
       <p:sp>
         <p:nvSpPr>
-          <p:cNvPr id="948129598" name="Slide Number Placeholder 6"/>
+          <p:cNvPr id="1665378493" name="Slide Number Placeholder 6"/>
           <p:cNvSpPr>
             <a:spLocks noGrp="1"/>
           </p:cNvSpPr>
@@ -3108,7 +3108,7 @@
       </p:grpSpPr>
       <p:sp>
         <p:nvSpPr>
-          <p:cNvPr id="348199448" name="Title 1"/>
+          <p:cNvPr id="1263372340" name="Title 1"/>
           <p:cNvSpPr>
             <a:spLocks noGrp="1"/>
           </p:cNvSpPr>
@@ -3139,7 +3139,7 @@
       </p:sp>
       <p:sp>
         <p:nvSpPr>
-          <p:cNvPr id="1692404935" name="Text Placeholder 2"/>
+          <p:cNvPr id="769125402" name="Text Placeholder 2"/>
           <p:cNvSpPr>
             <a:spLocks noGrp="1"/>
           </p:cNvSpPr>
@@ -3207,7 +3207,7 @@
       </p:sp>
       <p:sp>
         <p:nvSpPr>
-          <p:cNvPr id="1103593303" name="Content Placeholder 3"/>
+          <p:cNvPr id="1957557949" name="Content Placeholder 3"/>
           <p:cNvSpPr>
             <a:spLocks noGrp="1"/>
           </p:cNvSpPr>
@@ -3278,7 +3278,7 @@
       </p:sp>
       <p:sp>
         <p:nvSpPr>
-          <p:cNvPr id="483348424" name="Text Placeholder 4"/>
+          <p:cNvPr id="371138273" name="Text Placeholder 4"/>
           <p:cNvSpPr>
             <a:spLocks noGrp="1"/>
           </p:cNvSpPr>
@@ -3346,7 +3346,7 @@
       </p:sp>
       <p:sp>
         <p:nvSpPr>
-          <p:cNvPr id="186071806" name="Content Placeholder 5"/>
+          <p:cNvPr id="951096522" name="Content Placeholder 5"/>
           <p:cNvSpPr>
             <a:spLocks noGrp="1"/>
           </p:cNvSpPr>
@@ -3417,7 +3417,7 @@
       </p:sp>
       <p:sp>
         <p:nvSpPr>
-          <p:cNvPr id="1427185115" name="Date Placeholder 6"/>
+          <p:cNvPr id="1222232587" name="Date Placeholder 6"/>
           <p:cNvSpPr>
             <a:spLocks noGrp="1"/>
           </p:cNvSpPr>
@@ -3443,7 +3443,7 @@
       </p:sp>
       <p:sp>
         <p:nvSpPr>
-          <p:cNvPr id="2055915832" name="Footer Placeholder 7"/>
+          <p:cNvPr id="539036354" name="Footer Placeholder 7"/>
           <p:cNvSpPr>
             <a:spLocks noGrp="1"/>
           </p:cNvSpPr>
@@ -3465,7 +3465,7 @@
       </p:sp>
       <p:sp>
         <p:nvSpPr>
-          <p:cNvPr id="943612745" name="Slide Number Placeholder 8"/>
+          <p:cNvPr id="1768790982" name="Slide Number Placeholder 8"/>
           <p:cNvSpPr>
             <a:spLocks noGrp="1"/>
           </p:cNvSpPr>
@@ -3516,7 +3516,7 @@
       </p:grpSpPr>
       <p:sp>
         <p:nvSpPr>
-          <p:cNvPr id="1857420823" name="Title 1"/>
+          <p:cNvPr id="1697067027" name="Title 1"/>
           <p:cNvSpPr>
             <a:spLocks noGrp="1"/>
           </p:cNvSpPr>
@@ -3542,7 +3542,7 @@
       </p:sp>
       <p:sp>
         <p:nvSpPr>
-          <p:cNvPr id="778377120" name="Date Placeholder 2"/>
+          <p:cNvPr id="1357003026" name="Date Placeholder 2"/>
           <p:cNvSpPr>
             <a:spLocks noGrp="1"/>
           </p:cNvSpPr>
@@ -3568,7 +3568,7 @@
       </p:sp>
       <p:sp>
         <p:nvSpPr>
-          <p:cNvPr id="73032550" name="Footer Placeholder 3"/>
+          <p:cNvPr id="1122626274" name="Footer Placeholder 3"/>
           <p:cNvSpPr>
             <a:spLocks noGrp="1"/>
           </p:cNvSpPr>
@@ -3590,7 +3590,7 @@
       </p:sp>
       <p:sp>
         <p:nvSpPr>
-          <p:cNvPr id="1193211344" name="Slide Number Placeholder 4"/>
+          <p:cNvPr id="1522420894" name="Slide Number Placeholder 4"/>
           <p:cNvSpPr>
             <a:spLocks noGrp="1"/>
           </p:cNvSpPr>
@@ -3641,7 +3641,7 @@
       </p:grpSpPr>
       <p:sp>
         <p:nvSpPr>
-          <p:cNvPr id="1067347011" name="Date Placeholder 1"/>
+          <p:cNvPr id="709010437" name="Date Placeholder 1"/>
           <p:cNvSpPr>
             <a:spLocks noGrp="1"/>
           </p:cNvSpPr>
@@ -3667,7 +3667,7 @@
       </p:sp>
       <p:sp>
         <p:nvSpPr>
-          <p:cNvPr id="1796998703" name="Footer Placeholder 2"/>
+          <p:cNvPr id="379791156" name="Footer Placeholder 2"/>
           <p:cNvSpPr>
             <a:spLocks noGrp="1"/>
           </p:cNvSpPr>
@@ -3689,7 +3689,7 @@
       </p:sp>
       <p:sp>
         <p:nvSpPr>
-          <p:cNvPr id="700479043" name="Slide Number Placeholder 3"/>
+          <p:cNvPr id="1334252171" name="Slide Number Placeholder 3"/>
           <p:cNvSpPr>
             <a:spLocks noGrp="1"/>
           </p:cNvSpPr>
@@ -3740,7 +3740,7 @@
       </p:grpSpPr>
       <p:sp>
         <p:nvSpPr>
-          <p:cNvPr id="1861765962" name="Title 1"/>
+          <p:cNvPr id="207088258" name="Title 1"/>
           <p:cNvSpPr>
             <a:spLocks noGrp="1"/>
           </p:cNvSpPr>
@@ -3775,7 +3775,7 @@
       </p:sp>
       <p:sp>
         <p:nvSpPr>
-          <p:cNvPr id="608379241" name="Content Placeholder 2"/>
+          <p:cNvPr id="1349753560" name="Content Placeholder 2"/>
           <p:cNvSpPr>
             <a:spLocks noGrp="1"/>
           </p:cNvSpPr>
@@ -3874,7 +3874,7 @@
       </p:sp>
       <p:sp>
         <p:nvSpPr>
-          <p:cNvPr id="690081395" name="Text Placeholder 3"/>
+          <p:cNvPr id="1125577889" name="Text Placeholder 3"/>
           <p:cNvSpPr>
             <a:spLocks noGrp="1"/>
           </p:cNvSpPr>
@@ -3942,7 +3942,7 @@
       </p:sp>
       <p:sp>
         <p:nvSpPr>
-          <p:cNvPr id="195169496" name="Date Placeholder 4"/>
+          <p:cNvPr id="1586888020" name="Date Placeholder 4"/>
           <p:cNvSpPr>
             <a:spLocks noGrp="1"/>
           </p:cNvSpPr>
@@ -3968,7 +3968,7 @@
       </p:sp>
       <p:sp>
         <p:nvSpPr>
-          <p:cNvPr id="750081816" name="Footer Placeholder 5"/>
+          <p:cNvPr id="1041009387" name="Footer Placeholder 5"/>
           <p:cNvSpPr>
             <a:spLocks noGrp="1"/>
           </p:cNvSpPr>
@@ -3990,7 +3990,7 @@
       </p:sp>
       <p:sp>
         <p:nvSpPr>
-          <p:cNvPr id="199902803" name="Slide Number Placeholder 6"/>
+          <p:cNvPr id="793690728" name="Slide Number Placeholder 6"/>
           <p:cNvSpPr>
             <a:spLocks noGrp="1"/>
           </p:cNvSpPr>
@@ -4041,7 +4041,7 @@
       </p:grpSpPr>
       <p:sp>
         <p:nvSpPr>
-          <p:cNvPr id="1550154822" name="Title 1"/>
+          <p:cNvPr id="987135520" name="Title 1"/>
           <p:cNvSpPr>
             <a:spLocks noGrp="1"/>
           </p:cNvSpPr>
@@ -4076,7 +4076,7 @@
       </p:sp>
       <p:sp>
         <p:nvSpPr>
-          <p:cNvPr id="2106473678" name="Picture Placeholder 2"/>
+          <p:cNvPr id="201047570" name="Picture Placeholder 2"/>
           <p:cNvSpPr>
             <a:spLocks noChangeAspect="1" noGrp="1"/>
           </p:cNvSpPr>
@@ -4144,7 +4144,7 @@
       </p:sp>
       <p:sp>
         <p:nvSpPr>
-          <p:cNvPr id="1321207904" name="Text Placeholder 3"/>
+          <p:cNvPr id="579124144" name="Text Placeholder 3"/>
           <p:cNvSpPr>
             <a:spLocks noGrp="1"/>
           </p:cNvSpPr>
@@ -4212,7 +4212,7 @@
       </p:sp>
       <p:sp>
         <p:nvSpPr>
-          <p:cNvPr id="1774882824" name="Date Placeholder 4"/>
+          <p:cNvPr id="811390353" name="Date Placeholder 4"/>
           <p:cNvSpPr>
             <a:spLocks noGrp="1"/>
           </p:cNvSpPr>
@@ -4238,7 +4238,7 @@
       </p:sp>
       <p:sp>
         <p:nvSpPr>
-          <p:cNvPr id="3357045" name="Footer Placeholder 5"/>
+          <p:cNvPr id="1999060828" name="Footer Placeholder 5"/>
           <p:cNvSpPr>
             <a:spLocks noGrp="1"/>
           </p:cNvSpPr>
@@ -4260,7 +4260,7 @@
       </p:sp>
       <p:sp>
         <p:nvSpPr>
-          <p:cNvPr id="669310866" name="Slide Number Placeholder 6"/>
+          <p:cNvPr id="320442893" name="Slide Number Placeholder 6"/>
           <p:cNvSpPr>
             <a:spLocks noGrp="1"/>
           </p:cNvSpPr>
@@ -4316,7 +4316,7 @@
       </p:grpSpPr>
       <p:sp>
         <p:nvSpPr>
-          <p:cNvPr id="998744197" name="Title Placeholder 1"/>
+          <p:cNvPr id="2019285619" name="Title Placeholder 1"/>
           <p:cNvSpPr>
             <a:spLocks noGrp="1"/>
           </p:cNvSpPr>
@@ -4352,7 +4352,7 @@
       </p:sp>
       <p:sp>
         <p:nvSpPr>
-          <p:cNvPr id="287259378" name="Text Placeholder 2"/>
+          <p:cNvPr id="571481333" name="Text Placeholder 2"/>
           <p:cNvSpPr>
             <a:spLocks noGrp="1"/>
           </p:cNvSpPr>
@@ -4428,7 +4428,7 @@
       </p:sp>
       <p:sp>
         <p:nvSpPr>
-          <p:cNvPr id="2040389911" name="Date Placeholder 3"/>
+          <p:cNvPr id="777171412" name="Date Placeholder 3"/>
           <p:cNvSpPr>
             <a:spLocks noGrp="1"/>
           </p:cNvSpPr>
@@ -4472,7 +4472,7 @@
       </p:sp>
       <p:sp>
         <p:nvSpPr>
-          <p:cNvPr id="215551076" name="Footer Placeholder 4"/>
+          <p:cNvPr id="1586652364" name="Footer Placeholder 4"/>
           <p:cNvSpPr>
             <a:spLocks noGrp="1"/>
           </p:cNvSpPr>
@@ -4512,7 +4512,7 @@
       </p:sp>
       <p:sp>
         <p:nvSpPr>
-          <p:cNvPr id="534521442" name="Slide Number Placeholder 5"/>
+          <p:cNvPr id="1935814656" name="Slide Number Placeholder 5"/>
           <p:cNvSpPr>
             <a:spLocks noGrp="1"/>
           </p:cNvSpPr>
@@ -4872,7 +4872,7 @@
       </p:grpSpPr>
       <p:sp>
         <p:nvSpPr>
-          <p:cNvPr id="1168878536" name="Title 1"/>
+          <p:cNvPr id="10007774" name="Title 1"/>
           <p:cNvSpPr>
             <a:spLocks noGrp="1"/>
           </p:cNvSpPr>
@@ -4898,7 +4898,7 @@
       </p:sp>
       <p:sp>
         <p:nvSpPr>
-          <p:cNvPr id="1161160280" name="Subtitle 2"/>
+          <p:cNvPr id="1488309491" name="Subtitle 2"/>
           <p:cNvSpPr>
             <a:spLocks noGrp="1"/>
           </p:cNvSpPr>
@@ -5225,7 +5225,7 @@
                       </a:pPr>
                       <a:r>
                         <a:rPr sz="1400" b="1"/>
-                        <a:t>Got pregnant within the study within 13 weeks</a:t>
+                        <a:t>Got pregnant within the study within 13 cycles</a:t>
                       </a:r>
                       <a:endParaRPr sz="1400" b="1"/>
                     </a:p>
@@ -5301,7 +5301,7 @@
                       </a:pPr>
                       <a:r>
                         <a:rPr sz="1400"/>
-                        <a:t>Got pregnant within 13 weeks out of all </a:t>
+                        <a:t>Got pregnant within 13 cycles out of all </a:t>
                       </a:r>
                       <a:r>
                         <a:rPr sz="1400" u="sng"/>
@@ -5627,9 +5627,94 @@
           </a:p>
         </p:txBody>
       </p:sp>
+      <p:sp>
+        <p:nvSpPr>
+          <p:cNvPr id="995768280" name="Content Placeholder 2"/>
+          <p:cNvSpPr>
+            <a:spLocks noGrp="1"/>
+          </p:cNvSpPr>
+          <p:nvPr>
+            <p:ph idx="1"/>
+          </p:nvPr>
+        </p:nvSpPr>
+        <p:spPr bwMode="auto">
+          <a:xfrm flipH="0" flipV="0">
+            <a:off x="4824966" y="1514220"/>
+            <a:ext cx="7186083" cy="1213103"/>
+          </a:xfrm>
+        </p:spPr>
+        <p:txBody>
+          <a:bodyPr vertOverflow="overflow" horzOverflow="overflow" vert="horz" wrap="square" lIns="91440" tIns="45720" rIns="91440" bIns="45720" numCol="1" spcCol="0" rtlCol="0" fromWordArt="0" anchor="t" anchorCtr="0" forceAA="0" upright="0" compatLnSpc="0">
+            <a:normAutofit fontScale="85000" lnSpcReduction="3000"/>
+          </a:bodyPr>
+          <a:lstStyle/>
+          <a:p>
+            <a:pPr marL="457200" lvl="1" indent="0" algn="l">
+              <a:buFont typeface="Arial"/>
+              <a:buNone/>
+              <a:defRPr/>
+            </a:pPr>
+            <a:r>
+              <a:rPr b="1" u="sng"/>
+              <a:t>Answer:</a:t>
+            </a:r>
+            <a:endParaRPr/>
+          </a:p>
+          <a:p>
+            <a:pPr lvl="1" algn="l">
+              <a:defRPr/>
+            </a:pPr>
+            <a:r>
+              <a:rPr/>
+              <a:t>Majority of participants (&gt;50%) got pregnant </a:t>
+            </a:r>
+            <a:r>
+              <a:rPr lang="en-GB" sz="2000" b="0" i="0" u="none" strike="noStrike" cap="none" spc="0">
+                <a:solidFill>
+                  <a:schemeClr val="tx1"/>
+                </a:solidFill>
+                <a:latin typeface="Arial"/>
+                <a:ea typeface="Arial"/>
+                <a:cs typeface="Arial"/>
+              </a:rPr>
+              <a:t>≤</a:t>
+            </a:r>
+            <a:r>
+              <a:rPr/>
+              <a:t> 2 cycles</a:t>
+            </a:r>
+            <a:endParaRPr/>
+          </a:p>
+          <a:p>
+            <a:pPr lvl="1" algn="l">
+              <a:defRPr/>
+            </a:pPr>
+            <a:r>
+              <a:rPr/>
+              <a:t>90% did so </a:t>
+            </a:r>
+            <a:r>
+              <a:rPr lang="en-GB" sz="2000" b="0" i="0" u="none" strike="noStrike" cap="none" spc="0">
+                <a:solidFill>
+                  <a:schemeClr val="tx1"/>
+                </a:solidFill>
+                <a:latin typeface="Arial"/>
+                <a:ea typeface="Arial"/>
+                <a:cs typeface="Arial"/>
+              </a:rPr>
+              <a:t>≤ </a:t>
+            </a:r>
+            <a:r>
+              <a:rPr/>
+              <a:t>7 cycles</a:t>
+            </a:r>
+            <a:endParaRPr/>
+          </a:p>
+        </p:txBody>
+      </p:sp>
       <p:pic>
         <p:nvPicPr>
-          <p:cNvPr id="1706846424" name=""/>
+          <p:cNvPr id="1661534957" name=""/>
           <p:cNvPicPr>
             <a:picLocks noChangeAspect="1"/>
           </p:cNvPicPr>
@@ -5640,100 +5725,15 @@
           <a:stretch/>
         </p:blipFill>
         <p:spPr bwMode="auto">
-          <a:xfrm flipH="0" flipV="0">
-            <a:off x="41791" y="2853520"/>
-            <a:ext cx="12108417" cy="3976544"/>
+          <a:xfrm>
+            <a:off x="0" y="2853520"/>
+            <a:ext cx="12191999" cy="4003994"/>
           </a:xfrm>
           <a:prstGeom prst="rect">
             <a:avLst/>
           </a:prstGeom>
         </p:spPr>
       </p:pic>
-      <p:sp>
-        <p:nvSpPr>
-          <p:cNvPr id="995768280" name="Content Placeholder 2"/>
-          <p:cNvSpPr>
-            <a:spLocks noGrp="1"/>
-          </p:cNvSpPr>
-          <p:nvPr>
-            <p:ph idx="1"/>
-          </p:nvPr>
-        </p:nvSpPr>
-        <p:spPr bwMode="auto">
-          <a:xfrm flipH="0" flipV="0">
-            <a:off x="4824966" y="1514220"/>
-            <a:ext cx="7186083" cy="1213103"/>
-          </a:xfrm>
-        </p:spPr>
-        <p:txBody>
-          <a:bodyPr vertOverflow="overflow" horzOverflow="overflow" vert="horz" wrap="square" lIns="91440" tIns="45720" rIns="91440" bIns="45720" numCol="1" spcCol="0" rtlCol="0" fromWordArt="0" anchor="t" anchorCtr="0" forceAA="0" upright="0" compatLnSpc="0">
-            <a:normAutofit fontScale="85000" lnSpcReduction="3000"/>
-          </a:bodyPr>
-          <a:lstStyle/>
-          <a:p>
-            <a:pPr marL="457200" lvl="1" indent="0" algn="l">
-              <a:buFont typeface="Arial"/>
-              <a:buNone/>
-              <a:defRPr/>
-            </a:pPr>
-            <a:r>
-              <a:rPr b="1" u="sng"/>
-              <a:t>Answer:</a:t>
-            </a:r>
-            <a:endParaRPr/>
-          </a:p>
-          <a:p>
-            <a:pPr lvl="1" algn="l">
-              <a:defRPr/>
-            </a:pPr>
-            <a:r>
-              <a:rPr/>
-              <a:t>Majority of participants (&gt;50%) got pregnant </a:t>
-            </a:r>
-            <a:r>
-              <a:rPr lang="en-GB" sz="2000" b="0" i="0" u="none" strike="noStrike" cap="none" spc="0">
-                <a:solidFill>
-                  <a:schemeClr val="tx1"/>
-                </a:solidFill>
-                <a:latin typeface="Arial"/>
-                <a:ea typeface="Arial"/>
-                <a:cs typeface="Arial"/>
-              </a:rPr>
-              <a:t>≤</a:t>
-            </a:r>
-            <a:r>
-              <a:rPr/>
-              <a:t> 2 cycles</a:t>
-            </a:r>
-            <a:endParaRPr/>
-          </a:p>
-          <a:p>
-            <a:pPr lvl="1" algn="l">
-              <a:defRPr/>
-            </a:pPr>
-            <a:r>
-              <a:rPr/>
-              <a:t>90% did so </a:t>
-            </a:r>
-            <a:r>
-              <a:rPr lang="en-GB" sz="2000" b="0" i="0" u="none" strike="noStrike" cap="none" spc="0">
-                <a:solidFill>
-                  <a:schemeClr val="tx1"/>
-                </a:solidFill>
-                <a:latin typeface="Arial"/>
-                <a:ea typeface="Arial"/>
-                <a:cs typeface="Arial"/>
-              </a:rPr>
-              <a:t>≤ </a:t>
-            </a:r>
-            <a:r>
-              <a:rPr/>
-              <a:t>7 cycles</a:t>
-            </a:r>
-            <a:endParaRPr/>
-          </a:p>
-        </p:txBody>
-      </p:sp>
     </p:spTree>
   </p:cSld>
   <p:clrMapOvr>
@@ -6304,8 +6304,14 @@
             </a:pPr>
             <a:r>
               <a:rPr/>
-              <a:t>Exclude country:</a:t>
-            </a:r>
+              <a:t>Exclude country: while country/cultural effects are interesting, but collected data does not cater towards this</a:t>
+            </a:r>
+            <a:endParaRPr/>
+          </a:p>
+          <a:p>
+            <a:pPr>
+              <a:defRPr/>
+            </a:pPr>
             <a:endParaRPr/>
           </a:p>
         </p:txBody>
@@ -6324,8 +6330,8 @@
         </p:blipFill>
         <p:spPr bwMode="auto">
           <a:xfrm flipH="0" flipV="0">
-            <a:off x="3572849" y="1695761"/>
-            <a:ext cx="8385360" cy="5010712"/>
+            <a:off x="5049225" y="2577976"/>
+            <a:ext cx="6908985" cy="4128497"/>
           </a:xfrm>
           <a:prstGeom prst="rect">
             <a:avLst/>
@@ -6459,15 +6465,228 @@
                 <a:solidFill>
                   <a:schemeClr val="tx1"/>
                 </a:solidFill>
+                <a:latin typeface="+mn-lt"/>
+                <a:ea typeface="+mn-ea"/>
+                <a:cs typeface="+mn-cs"/>
+              </a:rPr>
+              <a:t>Two approaches:</a:t>
+            </a:r>
+            <a:endParaRPr sz="2800"/>
+          </a:p>
+          <a:p>
+            <a:pPr lvl="1">
+              <a:defRPr/>
+            </a:pPr>
+            <a:r>
+              <a:rPr lang="en-GB" sz="2800" b="0" i="0" u="none" strike="noStrike" cap="none" spc="0">
+                <a:solidFill>
+                  <a:schemeClr val="tx1"/>
+                </a:solidFill>
+                <a:latin typeface="+mn-lt"/>
+                <a:ea typeface="+mn-ea"/>
+                <a:cs typeface="+mn-cs"/>
+              </a:rPr>
+              <a:t>Non-ML </a:t>
+            </a:r>
+            <a:r>
+              <a:rPr lang="en-GB" sz="2800" b="0" i="0" u="none" strike="noStrike" cap="none" spc="0">
+                <a:solidFill>
+                  <a:schemeClr val="tx1"/>
+                </a:solidFill>
+                <a:latin typeface="+mn-lt"/>
+                <a:ea typeface="+mn-ea"/>
+                <a:cs typeface="+mn-cs"/>
+              </a:rPr>
+              <a:t>   </a:t>
+            </a:r>
+            <a:r>
+              <a:rPr lang="en-GB" sz="2800" b="0" i="0" u="none" strike="noStrike" cap="none" spc="0">
+                <a:solidFill>
+                  <a:schemeClr val="tx1"/>
+                </a:solidFill>
                 <a:latin typeface="Arial"/>
                 <a:ea typeface="Arial"/>
                 <a:cs typeface="Arial"/>
               </a:rPr>
-              <a:t>What trade-offs would you consider?</a:t>
-            </a:r>
-            <a:endParaRPr/>
-          </a:p>
-        </p:txBody>
+              <a:t> </a:t>
+            </a:r>
+            <a:endParaRPr sz="2800"/>
+          </a:p>
+          <a:p>
+            <a:pPr lvl="1">
+              <a:defRPr/>
+            </a:pPr>
+            <a:endParaRPr sz="2800"/>
+          </a:p>
+          <a:p>
+            <a:pPr lvl="0">
+              <a:defRPr/>
+            </a:pPr>
+            <a:r>
+              <a:rPr lang="en-GB" sz="2400" b="1" i="0" u="none" strike="noStrike" cap="none" spc="0">
+                <a:solidFill>
+                  <a:schemeClr val="tx1"/>
+                </a:solidFill>
+                <a:latin typeface="Arial"/>
+                <a:ea typeface="Arial"/>
+                <a:cs typeface="Arial"/>
+              </a:rPr>
+              <a:t>ML:</a:t>
+            </a:r>
+            <a:endParaRPr lang="en-GB" sz="2400" b="1" i="0" u="none" strike="noStrike" cap="none" spc="0">
+              <a:solidFill>
+                <a:schemeClr val="tx1"/>
+              </a:solidFill>
+              <a:latin typeface="Times New Roman"/>
+              <a:cs typeface="Times New Roman"/>
+            </a:endParaRPr>
+          </a:p>
+          <a:p>
+            <a:pPr lvl="0">
+              <a:defRPr/>
+            </a:pPr>
+            <a:endParaRPr sz="2400"/>
+          </a:p>
+          <a:p>
+            <a:pPr lvl="0">
+              <a:defRPr/>
+            </a:pPr>
+            <a:endParaRPr lang="en-GB" sz="2400" b="1" i="0" u="none" strike="noStrike" cap="none" spc="0">
+              <a:solidFill>
+                <a:schemeClr val="tx1"/>
+              </a:solidFill>
+              <a:latin typeface="Times New Roman"/>
+              <a:cs typeface="Times New Roman"/>
+            </a:endParaRPr>
+          </a:p>
+          <a:p>
+            <a:pPr lvl="0">
+              <a:defRPr/>
+            </a:pPr>
+            <a:r>
+              <a:rPr lang="en-GB" sz="2400" b="1" i="0" u="none" strike="noStrike" cap="none" spc="0">
+                <a:solidFill>
+                  <a:schemeClr val="tx1"/>
+                </a:solidFill>
+                <a:latin typeface="Arial"/>
+                <a:ea typeface="Arial"/>
+                <a:cs typeface="Arial"/>
+              </a:rPr>
+              <a:t>Why?</a:t>
+            </a:r>
+            <a:endParaRPr lang="en-GB" sz="2400" b="1" i="0" u="none" strike="noStrike" cap="none" spc="0">
+              <a:solidFill>
+                <a:schemeClr val="tx1"/>
+              </a:solidFill>
+              <a:latin typeface="Times New Roman"/>
+              <a:cs typeface="Times New Roman"/>
+            </a:endParaRPr>
+          </a:p>
+          <a:p>
+            <a:pPr lvl="1">
+              <a:defRPr/>
+            </a:pPr>
+            <a:r>
+              <a:rPr lang="en-GB" sz="2400" b="0" i="0" u="none" strike="noStrike" cap="none" spc="0">
+                <a:solidFill>
+                  <a:schemeClr val="tx1"/>
+                </a:solidFill>
+                <a:latin typeface="+mn-lt"/>
+                <a:ea typeface="+mn-ea"/>
+                <a:cs typeface="+mn-cs"/>
+              </a:rPr>
+              <a:t>Possible to discover complex patterns</a:t>
+            </a:r>
+            <a:endParaRPr lang="en-GB" sz="2400" b="0" i="0" u="none" strike="noStrike" cap="none" spc="0">
+              <a:solidFill>
+                <a:schemeClr val="tx1"/>
+              </a:solidFill>
+              <a:latin typeface="Times New Roman"/>
+              <a:cs typeface="Times New Roman"/>
+            </a:endParaRPr>
+          </a:p>
+          <a:p>
+            <a:pPr lvl="1">
+              <a:defRPr/>
+            </a:pPr>
+            <a:r>
+              <a:rPr lang="en-GB" sz="2400" b="0" i="0" u="none" strike="noStrike" cap="none" spc="0">
+                <a:solidFill>
+                  <a:schemeClr val="tx1"/>
+                </a:solidFill>
+                <a:latin typeface="Arial"/>
+                <a:ea typeface="Arial"/>
+                <a:cs typeface="Arial"/>
+              </a:rPr>
+              <a:t>Gives possibility for (more) accurate predictions</a:t>
+            </a:r>
+            <a:endParaRPr sz="2400"/>
+          </a:p>
+          <a:p>
+            <a:pPr lvl="1">
+              <a:defRPr/>
+            </a:pPr>
+            <a:endParaRPr/>
+          </a:p>
+        </p:txBody>
+      </p:sp>
+      <p:pic>
+        <p:nvPicPr>
+          <p:cNvPr id="976206814" name=""/>
+          <p:cNvPicPr>
+            <a:picLocks noChangeAspect="1"/>
+          </p:cNvPicPr>
+          <p:nvPr/>
+        </p:nvPicPr>
+        <p:blipFill>
+          <a:blip r:embed="rId3"/>
+          <a:srcRect l="0" t="0" r="38250" b="0"/>
+          <a:stretch/>
+        </p:blipFill>
+        <p:spPr bwMode="auto">
+          <a:xfrm flipH="0" flipV="0">
+            <a:off x="6018290" y="1924049"/>
+            <a:ext cx="2278959" cy="2515716"/>
+          </a:xfrm>
+          <a:prstGeom prst="rect">
+            <a:avLst/>
+          </a:prstGeom>
+        </p:spPr>
+      </p:pic>
+      <p:sp>
+        <p:nvSpPr>
+          <p:cNvPr id="2130268052" name=""/>
+          <p:cNvSpPr/>
+          <p:nvPr/>
+        </p:nvSpPr>
+        <p:spPr bwMode="auto">
+          <a:xfrm rot="0" flipH="0" flipV="0">
+            <a:off x="3001349" y="3262312"/>
+            <a:ext cx="2543175" cy="333373"/>
+          </a:xfrm>
+          <a:prstGeom prst="rightArrow">
+            <a:avLst>
+              <a:gd name="adj1" fmla="val 50000"/>
+              <a:gd name="adj2" fmla="val 50000"/>
+            </a:avLst>
+          </a:prstGeom>
+        </p:spPr>
+        <p:style>
+          <a:lnRef idx="2">
+            <a:schemeClr val="accent1">
+              <a:shade val="50000"/>
+            </a:schemeClr>
+          </a:lnRef>
+          <a:fillRef idx="1">
+            <a:schemeClr val="accent1"/>
+          </a:fillRef>
+          <a:effectRef idx="0">
+            <a:schemeClr val="accent1"/>
+          </a:effectRef>
+          <a:fontRef idx="minor">
+            <a:schemeClr val="lt1"/>
+          </a:fontRef>
+        </p:style>
       </p:sp>
     </p:spTree>
   </p:cSld>
@@ -8623,7 +8842,7 @@
         </p:spPr>
         <p:txBody>
           <a:bodyPr vertOverflow="overflow" horzOverflow="overflow" vert="horz" wrap="square" lIns="91440" tIns="45720" rIns="91440" bIns="45720" numCol="1" spcCol="0" rtlCol="0" fromWordArt="0" anchor="t" anchorCtr="0" forceAA="0" upright="0" compatLnSpc="0">
-            <a:normAutofit fontScale="90000" lnSpcReduction="2000"/>
+            <a:normAutofit fontScale="85000" lnSpcReduction="3000"/>
           </a:bodyPr>
           <a:lstStyle/>
           <a:p>
@@ -8789,6 +9008,16 @@
               <a:rPr sz="1200"/>
               <a:t>Cycle regularity</a:t>
             </a:r>
+            <a:endParaRPr sz="1200"/>
+          </a:p>
+          <a:p>
+            <a:pPr lvl="1">
+              <a:defRPr/>
+            </a:pPr>
+            <a:r>
+              <a:rPr sz="1200"/>
+              <a:t>Regular_cycle</a:t>
+            </a:r>
             <a:endParaRPr sz="1800"/>
           </a:p>
           <a:p>
@@ -8817,9 +9046,63 @@
           </a:p>
         </p:txBody>
       </p:sp>
+      <p:sp>
+        <p:nvSpPr>
+          <p:cNvPr id="287212932" name=""/>
+          <p:cNvSpPr txBox="1"/>
+          <p:nvPr/>
+        </p:nvSpPr>
+        <p:spPr bwMode="auto">
+          <a:xfrm rot="0" flipH="0" flipV="0">
+            <a:off x="312613" y="6416386"/>
+            <a:ext cx="6417826" cy="427079"/>
+          </a:xfrm>
+          <a:prstGeom prst="rect">
+            <a:avLst/>
+          </a:prstGeom>
+          <a:noFill/>
+        </p:spPr>
+        <p:txBody>
+          <a:bodyPr vertOverflow="overflow" horzOverflow="overflow" vert="horz" wrap="square" lIns="91440" tIns="45720" rIns="91440" bIns="45720" numCol="1" spcCol="0" rtlCol="0" fromWordArt="0" anchor="t" anchorCtr="0" forceAA="0" upright="0" compatLnSpc="0">
+            <a:spAutoFit/>
+          </a:bodyPr>
+          <a:p>
+            <a:pPr>
+              <a:defRPr/>
+            </a:pPr>
+            <a:r>
+              <a:rPr lang="en-GB" sz="1100" b="0" i="0" u="none" strike="noStrike" cap="none" spc="0">
+                <a:solidFill>
+                  <a:schemeClr val="tx1"/>
+                </a:solidFill>
+                <a:latin typeface="Arial"/>
+                <a:ea typeface="Arial"/>
+                <a:cs typeface="Arial"/>
+              </a:rPr>
+              <a:t>*Polycystic ovary syndrome (PCOS) is characterised by irregular menstrual cycles, higher chance of diabetis type II and difficulty getting pregnant</a:t>
+            </a:r>
+            <a:r>
+              <a:rPr sz="1100"/>
+              <a:t> - </a:t>
+            </a:r>
+            <a:r>
+              <a:rPr lang="en-GB" sz="900" b="0" i="0" u="none" strike="noStrike" cap="none" spc="0">
+                <a:solidFill>
+                  <a:schemeClr val="tx1"/>
+                </a:solidFill>
+                <a:latin typeface="Arial"/>
+                <a:ea typeface="Arial"/>
+                <a:cs typeface="Arial"/>
+              </a:rPr>
+              <a:t>https://en.wikipedia.org/wiki/Polycystic_ovary_syndrome</a:t>
+            </a:r>
+            <a:endParaRPr sz="1100"/>
+          </a:p>
+        </p:txBody>
+      </p:sp>
       <p:pic>
         <p:nvPicPr>
-          <p:cNvPr id="1577861182" name=""/>
+          <p:cNvPr id="13509617" name=""/>
           <p:cNvPicPr>
             <a:picLocks noChangeAspect="1"/>
           </p:cNvPicPr>
@@ -8831,68 +9114,14 @@
         </p:blipFill>
         <p:spPr bwMode="auto">
           <a:xfrm>
-            <a:off x="6962549" y="0"/>
-            <a:ext cx="5163506" cy="6858000"/>
+            <a:off x="7407833" y="0"/>
+            <a:ext cx="4558182" cy="6857999"/>
           </a:xfrm>
           <a:prstGeom prst="rect">
             <a:avLst/>
           </a:prstGeom>
         </p:spPr>
       </p:pic>
-      <p:sp>
-        <p:nvSpPr>
-          <p:cNvPr id="287212932" name=""/>
-          <p:cNvSpPr txBox="1"/>
-          <p:nvPr/>
-        </p:nvSpPr>
-        <p:spPr bwMode="auto">
-          <a:xfrm rot="0" flipH="0" flipV="0">
-            <a:off x="312613" y="6416386"/>
-            <a:ext cx="6417826" cy="427079"/>
-          </a:xfrm>
-          <a:prstGeom prst="rect">
-            <a:avLst/>
-          </a:prstGeom>
-          <a:noFill/>
-        </p:spPr>
-        <p:txBody>
-          <a:bodyPr vertOverflow="overflow" horzOverflow="overflow" vert="horz" wrap="square" lIns="91440" tIns="45720" rIns="91440" bIns="45720" numCol="1" spcCol="0" rtlCol="0" fromWordArt="0" anchor="t" anchorCtr="0" forceAA="0" upright="0" compatLnSpc="0">
-            <a:spAutoFit/>
-          </a:bodyPr>
-          <a:p>
-            <a:pPr>
-              <a:defRPr/>
-            </a:pPr>
-            <a:r>
-              <a:rPr lang="en-GB" sz="1100" b="0" i="0" u="none" strike="noStrike" cap="none" spc="0">
-                <a:solidFill>
-                  <a:schemeClr val="tx1"/>
-                </a:solidFill>
-                <a:latin typeface="Arial"/>
-                <a:ea typeface="Arial"/>
-                <a:cs typeface="Arial"/>
-              </a:rPr>
-              <a:t>*Polycystic ovary syndrome (PCOS) is characterised by irregular menstrual cycles, higher chance of diabetis type II and difficulty getting pregnant</a:t>
-            </a:r>
-            <a:r>
-              <a:rPr sz="1100"/>
-              <a:t> - </a:t>
-            </a:r>
-            <a:r>
-              <a:rPr lang="en-GB" sz="900" b="0" i="0" u="none" strike="noStrike" cap="none" spc="0">
-                <a:solidFill>
-                  <a:schemeClr val="tx1"/>
-                </a:solidFill>
-                <a:latin typeface="Arial"/>
-                <a:ea typeface="Arial"/>
-                <a:cs typeface="Arial"/>
-              </a:rPr>
-              <a:t>https://en.wikipedia.org/wiki/Polycystic_ovary_syndrome</a:t>
-            </a:r>
-            <a:endParaRPr sz="1100"/>
-          </a:p>
-        </p:txBody>
-      </p:sp>
     </p:spTree>
   </p:cSld>
   <p:clrMapOvr>

</xml_diff>

<commit_message>
Added XGboost classification with binned classes
</commit_message>
<xml_diff>
--- a/reports/Natural Cycles - Assignment Report - Jeroen Buil.pptx
+++ b/reports/Natural Cycles - Assignment Report - Jeroen Buil.pptx
@@ -5,7 +5,7 @@
     <p:sldMasterId id="2147483648" r:id="rId1"/>
   </p:sldMasterIdLst>
   <p:notesMasterIdLst>
-    <p:notesMasterId r:id="rId19"/>
+    <p:notesMasterId r:id="rId24"/>
   </p:notesMasterIdLst>
   <p:sldIdLst>
     <p:sldId id="256" r:id="rId4"/>
@@ -23,6 +23,11 @@
     <p:sldId id="268" r:id="rId16"/>
     <p:sldId id="269" r:id="rId17"/>
     <p:sldId id="270" r:id="rId18"/>
+    <p:sldId id="271" r:id="rId19"/>
+    <p:sldId id="272" r:id="rId20"/>
+    <p:sldId id="273" r:id="rId21"/>
+    <p:sldId id="274" r:id="rId22"/>
+    <p:sldId id="275" r:id="rId23"/>
   </p:sldIdLst>
   <p:sldSz cx="12192000" cy="6858000"/>
   <p:notesSz cx="6858000" cy="9144000"/>
@@ -148,7 +153,7 @@
       </p:grpSpPr>
       <p:sp>
         <p:nvSpPr>
-          <p:cNvPr id="639707234" name="Header Placeholder 1"/>
+          <p:cNvPr id="1531082925" name="Header Placeholder 1"/>
           <p:cNvSpPr>
             <a:spLocks noGrp="1"/>
           </p:cNvSpPr>
@@ -182,7 +187,7 @@
       </p:sp>
       <p:sp>
         <p:nvSpPr>
-          <p:cNvPr id="1677912674" name="Date Placeholder 2"/>
+          <p:cNvPr id="63671201" name="Date Placeholder 2"/>
           <p:cNvSpPr>
             <a:spLocks noGrp="1"/>
           </p:cNvSpPr>
@@ -220,7 +225,7 @@
       </p:sp>
       <p:sp>
         <p:nvSpPr>
-          <p:cNvPr id="593464996" name="Slide Image Placeholder 3"/>
+          <p:cNvPr id="458690095" name="Slide Image Placeholder 3"/>
           <p:cNvSpPr>
             <a:spLocks noChangeAspect="1" noGrp="1" noRot="1"/>
           </p:cNvSpPr>
@@ -256,7 +261,7 @@
       </p:sp>
       <p:sp>
         <p:nvSpPr>
-          <p:cNvPr id="1735553210" name="Notes Placeholder 4"/>
+          <p:cNvPr id="2063304992" name="Notes Placeholder 4"/>
           <p:cNvSpPr>
             <a:spLocks noGrp="1"/>
           </p:cNvSpPr>
@@ -330,7 +335,7 @@
       </p:sp>
       <p:sp>
         <p:nvSpPr>
-          <p:cNvPr id="383383786" name="Footer Placeholder 5"/>
+          <p:cNvPr id="1753018489" name="Footer Placeholder 5"/>
           <p:cNvSpPr>
             <a:spLocks noGrp="1"/>
           </p:cNvSpPr>
@@ -364,7 +369,7 @@
       </p:sp>
       <p:sp>
         <p:nvSpPr>
-          <p:cNvPr id="983638068" name="Slide Number Placeholder 6"/>
+          <p:cNvPr id="730772861" name="Slide Number Placeholder 6"/>
           <p:cNvSpPr>
             <a:spLocks noGrp="1"/>
           </p:cNvSpPr>
@@ -517,7 +522,7 @@
       </p:grpSpPr>
       <p:sp>
         <p:nvSpPr>
-          <p:cNvPr id="205695033" name="Slide Image Placeholder 1"/>
+          <p:cNvPr id="1352885282" name="Slide Image Placeholder 1"/>
           <p:cNvSpPr>
             <a:spLocks noChangeAspect="1" noGrp="1" noRot="1"/>
           </p:cNvSpPr>
@@ -534,7 +539,7 @@
       </p:sp>
       <p:sp>
         <p:nvSpPr>
-          <p:cNvPr id="1066446428" name="Notes Placeholder 2"/>
+          <p:cNvPr id="837829888" name="Notes Placeholder 2"/>
           <p:cNvSpPr>
             <a:spLocks noGrp="1"/>
           </p:cNvSpPr>
@@ -559,7 +564,7 @@
       </p:sp>
       <p:sp>
         <p:nvSpPr>
-          <p:cNvPr id="1784792487" name="Slide Number Placeholder 3"/>
+          <p:cNvPr id="219353513" name="Slide Number Placeholder 3"/>
           <p:cNvSpPr>
             <a:spLocks noGrp="1"/>
           </p:cNvSpPr>
@@ -950,7 +955,7 @@
       </p:grpSpPr>
       <p:sp>
         <p:nvSpPr>
-          <p:cNvPr id="1765164071" name="Slide Image Placeholder 1"/>
+          <p:cNvPr id="2" name="Slide Image Placeholder 1"/>
           <p:cNvSpPr>
             <a:spLocks noChangeAspect="1" noGrp="1" noRot="1"/>
           </p:cNvSpPr>
@@ -962,7 +967,7 @@
       </p:sp>
       <p:sp>
         <p:nvSpPr>
-          <p:cNvPr id="1230754478" name="Notes Placeholder 2"/>
+          <p:cNvPr id="3" name="Notes Placeholder 2"/>
           <p:cNvSpPr>
             <a:spLocks noGrp="1"/>
           </p:cNvSpPr>
@@ -984,7 +989,7 @@
       </p:sp>
       <p:sp>
         <p:nvSpPr>
-          <p:cNvPr id="777196587" name="Slide Number Placeholder 3"/>
+          <p:cNvPr id="4" name="Slide Number Placeholder 3"/>
           <p:cNvSpPr>
             <a:spLocks noGrp="1"/>
           </p:cNvSpPr>
@@ -1000,7 +1005,7 @@
             <a:pPr>
               <a:defRPr/>
             </a:pPr>
-            <a:fld id="{788CEE30-4AD7-0C6A-8200-4F846AE5E26F}" type="slidenum">
+            <a:fld id="{B429C30C-66C7-0D1D-F730-51E33663D45C}" type="slidenum">
               <a:rPr/>
               <a:t/>
             </a:fld>
@@ -1035,6 +1040,91 @@
       </p:grpSpPr>
       <p:sp>
         <p:nvSpPr>
+          <p:cNvPr id="1765164071" name="Slide Image Placeholder 1"/>
+          <p:cNvSpPr>
+            <a:spLocks noChangeAspect="1" noGrp="1" noRot="1"/>
+          </p:cNvSpPr>
+          <p:nvPr>
+            <p:ph type="sldImg"/>
+          </p:nvPr>
+        </p:nvSpPr>
+        <p:spPr bwMode="auto"/>
+      </p:sp>
+      <p:sp>
+        <p:nvSpPr>
+          <p:cNvPr id="1230754478" name="Notes Placeholder 2"/>
+          <p:cNvSpPr>
+            <a:spLocks noGrp="1"/>
+          </p:cNvSpPr>
+          <p:nvPr>
+            <p:ph type="body" idx="1"/>
+          </p:nvPr>
+        </p:nvSpPr>
+        <p:spPr bwMode="auto"/>
+        <p:txBody>
+          <a:bodyPr/>
+          <a:lstStyle/>
+          <a:p>
+            <a:pPr>
+              <a:defRPr/>
+            </a:pPr>
+            <a:endParaRPr/>
+          </a:p>
+        </p:txBody>
+      </p:sp>
+      <p:sp>
+        <p:nvSpPr>
+          <p:cNvPr id="777196587" name="Slide Number Placeholder 3"/>
+          <p:cNvSpPr>
+            <a:spLocks noGrp="1"/>
+          </p:cNvSpPr>
+          <p:nvPr>
+            <p:ph type="sldNum" sz="quarter" idx="10"/>
+          </p:nvPr>
+        </p:nvSpPr>
+        <p:spPr bwMode="auto"/>
+        <p:txBody>
+          <a:bodyPr/>
+          <a:lstStyle/>
+          <a:p>
+            <a:pPr>
+              <a:defRPr/>
+            </a:pPr>
+            <a:fld id="{788CEE30-4AD7-0C6A-8200-4F846AE5E26F}" type="slidenum">
+              <a:rPr/>
+              <a:t/>
+            </a:fld>
+            <a:endParaRPr/>
+          </a:p>
+        </p:txBody>
+      </p:sp>
+    </p:spTree>
+  </p:cSld>
+  <p:clrMapOvr>
+    <a:masterClrMapping/>
+  </p:clrMapOvr>
+</p:notes>
+</file>
+
+<file path=ppt/notesSlides/notesSlide16.xml><?xml version="1.0" encoding="utf-8"?>
+<p:notes xmlns:a="http://schemas.openxmlformats.org/drawingml/2006/main" xmlns:r="http://schemas.openxmlformats.org/officeDocument/2006/relationships" xmlns:p="http://schemas.openxmlformats.org/presentationml/2006/main" xmlns:m="http://schemas.openxmlformats.org/officeDocument/2006/math" xmlns:w="http://schemas.openxmlformats.org/wordprocessingml/2006/main">
+  <p:cSld name="">
+    <p:spTree>
+      <p:nvGrpSpPr>
+        <p:cNvPr id="1" name=""/>
+        <p:cNvGrpSpPr/>
+        <p:nvPr/>
+      </p:nvGrpSpPr>
+      <p:grpSpPr bwMode="auto">
+        <a:xfrm>
+          <a:off x="0" y="0"/>
+          <a:ext cx="0" cy="0"/>
+          <a:chOff x="0" y="0"/>
+          <a:chExt cx="0" cy="0"/>
+        </a:xfrm>
+      </p:grpSpPr>
+      <p:sp>
+        <p:nvSpPr>
           <p:cNvPr id="2" name="Slide Image Placeholder 1"/>
           <p:cNvSpPr>
             <a:spLocks noChangeAspect="1" noGrp="1" noRot="1"/>
@@ -1085,7 +1175,262 @@
             <a:pPr>
               <a:defRPr/>
             </a:pPr>
+            <a:fld id="{04B69D23-90C4-C267-E129-5B0DD52CC5E6}" type="slidenum">
+              <a:rPr/>
+              <a:t/>
+            </a:fld>
+            <a:endParaRPr/>
+          </a:p>
+        </p:txBody>
+      </p:sp>
+    </p:spTree>
+  </p:cSld>
+  <p:clrMapOvr>
+    <a:masterClrMapping/>
+  </p:clrMapOvr>
+</p:notes>
+</file>
+
+<file path=ppt/notesSlides/notesSlide17.xml><?xml version="1.0" encoding="utf-8"?>
+<p:notes xmlns:a="http://schemas.openxmlformats.org/drawingml/2006/main" xmlns:r="http://schemas.openxmlformats.org/officeDocument/2006/relationships" xmlns:p="http://schemas.openxmlformats.org/presentationml/2006/main" xmlns:m="http://schemas.openxmlformats.org/officeDocument/2006/math" xmlns:w="http://schemas.openxmlformats.org/wordprocessingml/2006/main">
+  <p:cSld name="">
+    <p:spTree>
+      <p:nvGrpSpPr>
+        <p:cNvPr id="1" name=""/>
+        <p:cNvGrpSpPr/>
+        <p:nvPr/>
+      </p:nvGrpSpPr>
+      <p:grpSpPr bwMode="auto">
+        <a:xfrm>
+          <a:off x="0" y="0"/>
+          <a:ext cx="0" cy="0"/>
+          <a:chOff x="0" y="0"/>
+          <a:chExt cx="0" cy="0"/>
+        </a:xfrm>
+      </p:grpSpPr>
+      <p:sp>
+        <p:nvSpPr>
+          <p:cNvPr id="2" name="Slide Image Placeholder 1"/>
+          <p:cNvSpPr>
+            <a:spLocks noChangeAspect="1" noGrp="1" noRot="1"/>
+          </p:cNvSpPr>
+          <p:nvPr>
+            <p:ph type="sldImg"/>
+          </p:nvPr>
+        </p:nvSpPr>
+        <p:spPr bwMode="auto"/>
+      </p:sp>
+      <p:sp>
+        <p:nvSpPr>
+          <p:cNvPr id="3" name="Notes Placeholder 2"/>
+          <p:cNvSpPr>
+            <a:spLocks noGrp="1"/>
+          </p:cNvSpPr>
+          <p:nvPr>
+            <p:ph type="body" idx="1"/>
+          </p:nvPr>
+        </p:nvSpPr>
+        <p:spPr bwMode="auto"/>
+        <p:txBody>
+          <a:bodyPr/>
+          <a:lstStyle/>
+          <a:p>
+            <a:pPr>
+              <a:defRPr/>
+            </a:pPr>
+            <a:endParaRPr/>
+          </a:p>
+        </p:txBody>
+      </p:sp>
+      <p:sp>
+        <p:nvSpPr>
+          <p:cNvPr id="4" name="Slide Number Placeholder 3"/>
+          <p:cNvSpPr>
+            <a:spLocks noGrp="1"/>
+          </p:cNvSpPr>
+          <p:nvPr>
+            <p:ph type="sldNum" sz="quarter" idx="10"/>
+          </p:nvPr>
+        </p:nvSpPr>
+        <p:spPr bwMode="auto"/>
+        <p:txBody>
+          <a:bodyPr/>
+          <a:lstStyle/>
+          <a:p>
+            <a:pPr>
+              <a:defRPr/>
+            </a:pPr>
+            <a:fld id="{5B4F7A61-9BF8-53D6-2DCA-1E5CFE09B63C}" type="slidenum">
+              <a:rPr/>
+              <a:t/>
+            </a:fld>
+            <a:endParaRPr/>
+          </a:p>
+        </p:txBody>
+      </p:sp>
+    </p:spTree>
+  </p:cSld>
+  <p:clrMapOvr>
+    <a:masterClrMapping/>
+  </p:clrMapOvr>
+</p:notes>
+</file>
+
+<file path=ppt/notesSlides/notesSlide18.xml><?xml version="1.0" encoding="utf-8"?>
+<p:notes xmlns:a="http://schemas.openxmlformats.org/drawingml/2006/main" xmlns:r="http://schemas.openxmlformats.org/officeDocument/2006/relationships" xmlns:p="http://schemas.openxmlformats.org/presentationml/2006/main" xmlns:m="http://schemas.openxmlformats.org/officeDocument/2006/math" xmlns:w="http://schemas.openxmlformats.org/wordprocessingml/2006/main">
+  <p:cSld name="">
+    <p:spTree>
+      <p:nvGrpSpPr>
+        <p:cNvPr id="1" name=""/>
+        <p:cNvGrpSpPr/>
+        <p:nvPr/>
+      </p:nvGrpSpPr>
+      <p:grpSpPr bwMode="auto">
+        <a:xfrm>
+          <a:off x="0" y="0"/>
+          <a:ext cx="0" cy="0"/>
+          <a:chOff x="0" y="0"/>
+          <a:chExt cx="0" cy="0"/>
+        </a:xfrm>
+      </p:grpSpPr>
+      <p:sp>
+        <p:nvSpPr>
+          <p:cNvPr id="2" name="Slide Image Placeholder 1"/>
+          <p:cNvSpPr>
+            <a:spLocks noChangeAspect="1" noGrp="1" noRot="1"/>
+          </p:cNvSpPr>
+          <p:nvPr>
+            <p:ph type="sldImg"/>
+          </p:nvPr>
+        </p:nvSpPr>
+        <p:spPr bwMode="auto"/>
+      </p:sp>
+      <p:sp>
+        <p:nvSpPr>
+          <p:cNvPr id="3" name="Notes Placeholder 2"/>
+          <p:cNvSpPr>
+            <a:spLocks noGrp="1"/>
+          </p:cNvSpPr>
+          <p:nvPr>
+            <p:ph type="body" idx="1"/>
+          </p:nvPr>
+        </p:nvSpPr>
+        <p:spPr bwMode="auto"/>
+        <p:txBody>
+          <a:bodyPr/>
+          <a:lstStyle/>
+          <a:p>
+            <a:pPr>
+              <a:defRPr/>
+            </a:pPr>
+            <a:endParaRPr/>
+          </a:p>
+        </p:txBody>
+      </p:sp>
+      <p:sp>
+        <p:nvSpPr>
+          <p:cNvPr id="4" name="Slide Number Placeholder 3"/>
+          <p:cNvSpPr>
+            <a:spLocks noGrp="1"/>
+          </p:cNvSpPr>
+          <p:nvPr>
+            <p:ph type="sldNum" sz="quarter" idx="10"/>
+          </p:nvPr>
+        </p:nvSpPr>
+        <p:spPr bwMode="auto"/>
+        <p:txBody>
+          <a:bodyPr/>
+          <a:lstStyle/>
+          <a:p>
+            <a:pPr>
+              <a:defRPr/>
+            </a:pPr>
             <a:fld id="{1E588ED2-1A8C-7863-10E1-29089B8E26DC}" type="slidenum">
+              <a:rPr/>
+              <a:t/>
+            </a:fld>
+            <a:endParaRPr/>
+          </a:p>
+        </p:txBody>
+      </p:sp>
+    </p:spTree>
+  </p:cSld>
+  <p:clrMapOvr>
+    <a:masterClrMapping/>
+  </p:clrMapOvr>
+</p:notes>
+</file>
+
+<file path=ppt/notesSlides/notesSlide19.xml><?xml version="1.0" encoding="utf-8"?>
+<p:notes xmlns:a="http://schemas.openxmlformats.org/drawingml/2006/main" xmlns:r="http://schemas.openxmlformats.org/officeDocument/2006/relationships" xmlns:p="http://schemas.openxmlformats.org/presentationml/2006/main" xmlns:m="http://schemas.openxmlformats.org/officeDocument/2006/math" xmlns:w="http://schemas.openxmlformats.org/wordprocessingml/2006/main">
+  <p:cSld name="">
+    <p:spTree>
+      <p:nvGrpSpPr>
+        <p:cNvPr id="1" name=""/>
+        <p:cNvGrpSpPr/>
+        <p:nvPr/>
+      </p:nvGrpSpPr>
+      <p:grpSpPr bwMode="auto">
+        <a:xfrm>
+          <a:off x="0" y="0"/>
+          <a:ext cx="0" cy="0"/>
+          <a:chOff x="0" y="0"/>
+          <a:chExt cx="0" cy="0"/>
+        </a:xfrm>
+      </p:grpSpPr>
+      <p:sp>
+        <p:nvSpPr>
+          <p:cNvPr id="2" name="Slide Image Placeholder 1"/>
+          <p:cNvSpPr>
+            <a:spLocks noChangeAspect="1" noGrp="1" noRot="1"/>
+          </p:cNvSpPr>
+          <p:nvPr>
+            <p:ph type="sldImg"/>
+          </p:nvPr>
+        </p:nvSpPr>
+        <p:spPr bwMode="auto"/>
+      </p:sp>
+      <p:sp>
+        <p:nvSpPr>
+          <p:cNvPr id="3" name="Notes Placeholder 2"/>
+          <p:cNvSpPr>
+            <a:spLocks noGrp="1"/>
+          </p:cNvSpPr>
+          <p:nvPr>
+            <p:ph type="body" idx="1"/>
+          </p:nvPr>
+        </p:nvSpPr>
+        <p:spPr bwMode="auto"/>
+        <p:txBody>
+          <a:bodyPr/>
+          <a:lstStyle/>
+          <a:p>
+            <a:pPr>
+              <a:defRPr/>
+            </a:pPr>
+            <a:endParaRPr/>
+          </a:p>
+        </p:txBody>
+      </p:sp>
+      <p:sp>
+        <p:nvSpPr>
+          <p:cNvPr id="4" name="Slide Number Placeholder 3"/>
+          <p:cNvSpPr>
+            <a:spLocks noGrp="1"/>
+          </p:cNvSpPr>
+          <p:nvPr>
+            <p:ph type="sldNum" sz="quarter" idx="10"/>
+          </p:nvPr>
+        </p:nvSpPr>
+        <p:spPr bwMode="auto"/>
+        <p:txBody>
+          <a:bodyPr/>
+          <a:lstStyle/>
+          <a:p>
+            <a:pPr>
+              <a:defRPr/>
+            </a:pPr>
+            <a:fld id="{DF69B596-1441-A599-88E6-0260730375F4}" type="slidenum">
               <a:rPr/>
               <a:t/>
             </a:fld>
@@ -1186,6 +1531,91 @@
 </p:notes>
 </file>
 
+<file path=ppt/notesSlides/notesSlide20.xml><?xml version="1.0" encoding="utf-8"?>
+<p:notes xmlns:a="http://schemas.openxmlformats.org/drawingml/2006/main" xmlns:r="http://schemas.openxmlformats.org/officeDocument/2006/relationships" xmlns:p="http://schemas.openxmlformats.org/presentationml/2006/main" xmlns:m="http://schemas.openxmlformats.org/officeDocument/2006/math" xmlns:w="http://schemas.openxmlformats.org/wordprocessingml/2006/main">
+  <p:cSld name="">
+    <p:spTree>
+      <p:nvGrpSpPr>
+        <p:cNvPr id="1" name=""/>
+        <p:cNvGrpSpPr/>
+        <p:nvPr/>
+      </p:nvGrpSpPr>
+      <p:grpSpPr bwMode="auto">
+        <a:xfrm>
+          <a:off x="0" y="0"/>
+          <a:ext cx="0" cy="0"/>
+          <a:chOff x="0" y="0"/>
+          <a:chExt cx="0" cy="0"/>
+        </a:xfrm>
+      </p:grpSpPr>
+      <p:sp>
+        <p:nvSpPr>
+          <p:cNvPr id="1551964618" name="Slide Image Placeholder 1"/>
+          <p:cNvSpPr>
+            <a:spLocks noChangeAspect="1" noGrp="1" noRot="1"/>
+          </p:cNvSpPr>
+          <p:nvPr>
+            <p:ph type="sldImg"/>
+          </p:nvPr>
+        </p:nvSpPr>
+        <p:spPr bwMode="auto"/>
+      </p:sp>
+      <p:sp>
+        <p:nvSpPr>
+          <p:cNvPr id="1053969228" name="Notes Placeholder 2"/>
+          <p:cNvSpPr>
+            <a:spLocks noGrp="1"/>
+          </p:cNvSpPr>
+          <p:nvPr>
+            <p:ph type="body" idx="1"/>
+          </p:nvPr>
+        </p:nvSpPr>
+        <p:spPr bwMode="auto"/>
+        <p:txBody>
+          <a:bodyPr/>
+          <a:lstStyle/>
+          <a:p>
+            <a:pPr>
+              <a:defRPr/>
+            </a:pPr>
+            <a:endParaRPr/>
+          </a:p>
+        </p:txBody>
+      </p:sp>
+      <p:sp>
+        <p:nvSpPr>
+          <p:cNvPr id="1565021372" name="Slide Number Placeholder 3"/>
+          <p:cNvSpPr>
+            <a:spLocks noGrp="1"/>
+          </p:cNvSpPr>
+          <p:nvPr>
+            <p:ph type="sldNum" sz="quarter" idx="10"/>
+          </p:nvPr>
+        </p:nvSpPr>
+        <p:spPr bwMode="auto"/>
+        <p:txBody>
+          <a:bodyPr/>
+          <a:lstStyle/>
+          <a:p>
+            <a:pPr>
+              <a:defRPr/>
+            </a:pPr>
+            <a:fld id="{543BC579-2C33-BB99-A553-C4F5CB3C60F5}" type="slidenum">
+              <a:rPr/>
+              <a:t/>
+            </a:fld>
+            <a:endParaRPr/>
+          </a:p>
+        </p:txBody>
+      </p:sp>
+    </p:spTree>
+  </p:cSld>
+  <p:clrMapOvr>
+    <a:masterClrMapping/>
+  </p:clrMapOvr>
+</p:notes>
+</file>
+
 <file path=ppt/notesSlides/notesSlide3.xml><?xml version="1.0" encoding="utf-8"?>
 <p:notes xmlns:a="http://schemas.openxmlformats.org/drawingml/2006/main" xmlns:r="http://schemas.openxmlformats.org/officeDocument/2006/relationships" xmlns:p="http://schemas.openxmlformats.org/presentationml/2006/main" xmlns:m="http://schemas.openxmlformats.org/officeDocument/2006/math" xmlns:w="http://schemas.openxmlformats.org/wordprocessingml/2006/main">
   <p:cSld name="">
@@ -1800,7 +2230,7 @@
       </p:grpSpPr>
       <p:sp>
         <p:nvSpPr>
-          <p:cNvPr id="1342571574" name="Title 1"/>
+          <p:cNvPr id="1713893488" name="Title 1"/>
           <p:cNvSpPr>
             <a:spLocks noGrp="1"/>
           </p:cNvSpPr>
@@ -1835,7 +2265,7 @@
       </p:sp>
       <p:sp>
         <p:nvSpPr>
-          <p:cNvPr id="1896747816" name="Subtitle 2"/>
+          <p:cNvPr id="862003350" name="Subtitle 2"/>
           <p:cNvSpPr>
             <a:spLocks noGrp="1"/>
           </p:cNvSpPr>
@@ -1903,7 +2333,7 @@
       </p:sp>
       <p:sp>
         <p:nvSpPr>
-          <p:cNvPr id="821489894" name="Date Placeholder 3"/>
+          <p:cNvPr id="25343387" name="Date Placeholder 3"/>
           <p:cNvSpPr>
             <a:spLocks noGrp="1"/>
           </p:cNvSpPr>
@@ -1929,7 +2359,7 @@
       </p:sp>
       <p:sp>
         <p:nvSpPr>
-          <p:cNvPr id="1040326216" name="Footer Placeholder 4"/>
+          <p:cNvPr id="1599381589" name="Footer Placeholder 4"/>
           <p:cNvSpPr>
             <a:spLocks noGrp="1"/>
           </p:cNvSpPr>
@@ -1951,7 +2381,7 @@
       </p:sp>
       <p:sp>
         <p:nvSpPr>
-          <p:cNvPr id="1799631588" name="Slide Number Placeholder 5"/>
+          <p:cNvPr id="893080208" name="Slide Number Placeholder 5"/>
           <p:cNvSpPr>
             <a:spLocks noGrp="1"/>
           </p:cNvSpPr>
@@ -2002,7 +2432,7 @@
       </p:grpSpPr>
       <p:sp>
         <p:nvSpPr>
-          <p:cNvPr id="909151071" name="Title 1"/>
+          <p:cNvPr id="1942448217" name="Title 1"/>
           <p:cNvSpPr>
             <a:spLocks noGrp="1"/>
           </p:cNvSpPr>
@@ -2028,7 +2458,7 @@
       </p:sp>
       <p:sp>
         <p:nvSpPr>
-          <p:cNvPr id="735972001" name="Vertical Text Placeholder 2"/>
+          <p:cNvPr id="1428322519" name="Vertical Text Placeholder 2"/>
           <p:cNvSpPr>
             <a:spLocks noGrp="1"/>
           </p:cNvSpPr>
@@ -2094,7 +2524,7 @@
       </p:sp>
       <p:sp>
         <p:nvSpPr>
-          <p:cNvPr id="155629598" name="Date Placeholder 3"/>
+          <p:cNvPr id="661396715" name="Date Placeholder 3"/>
           <p:cNvSpPr>
             <a:spLocks noGrp="1"/>
           </p:cNvSpPr>
@@ -2120,7 +2550,7 @@
       </p:sp>
       <p:sp>
         <p:nvSpPr>
-          <p:cNvPr id="402781289" name="Footer Placeholder 4"/>
+          <p:cNvPr id="934928683" name="Footer Placeholder 4"/>
           <p:cNvSpPr>
             <a:spLocks noGrp="1"/>
           </p:cNvSpPr>
@@ -2142,7 +2572,7 @@
       </p:sp>
       <p:sp>
         <p:nvSpPr>
-          <p:cNvPr id="63216115" name="Slide Number Placeholder 5"/>
+          <p:cNvPr id="1543056513" name="Slide Number Placeholder 5"/>
           <p:cNvSpPr>
             <a:spLocks noGrp="1"/>
           </p:cNvSpPr>
@@ -2193,7 +2623,7 @@
       </p:grpSpPr>
       <p:sp>
         <p:nvSpPr>
-          <p:cNvPr id="370147172" name="Vertical Title 1"/>
+          <p:cNvPr id="1328374361" name="Vertical Title 1"/>
           <p:cNvSpPr>
             <a:spLocks noGrp="1"/>
           </p:cNvSpPr>
@@ -2224,7 +2654,7 @@
       </p:sp>
       <p:sp>
         <p:nvSpPr>
-          <p:cNvPr id="751398947" name="Vertical Text Placeholder 2"/>
+          <p:cNvPr id="1795077647" name="Vertical Text Placeholder 2"/>
           <p:cNvSpPr>
             <a:spLocks noGrp="1"/>
           </p:cNvSpPr>
@@ -2295,7 +2725,7 @@
       </p:sp>
       <p:sp>
         <p:nvSpPr>
-          <p:cNvPr id="1747834350" name="Date Placeholder 3"/>
+          <p:cNvPr id="789783303" name="Date Placeholder 3"/>
           <p:cNvSpPr>
             <a:spLocks noGrp="1"/>
           </p:cNvSpPr>
@@ -2321,7 +2751,7 @@
       </p:sp>
       <p:sp>
         <p:nvSpPr>
-          <p:cNvPr id="1929735194" name="Footer Placeholder 4"/>
+          <p:cNvPr id="634583110" name="Footer Placeholder 4"/>
           <p:cNvSpPr>
             <a:spLocks noGrp="1"/>
           </p:cNvSpPr>
@@ -2343,7 +2773,7 @@
       </p:sp>
       <p:sp>
         <p:nvSpPr>
-          <p:cNvPr id="281501605" name="Slide Number Placeholder 5"/>
+          <p:cNvPr id="1161140927" name="Slide Number Placeholder 5"/>
           <p:cNvSpPr>
             <a:spLocks noGrp="1"/>
           </p:cNvSpPr>
@@ -2394,7 +2824,7 @@
       </p:grpSpPr>
       <p:sp>
         <p:nvSpPr>
-          <p:cNvPr id="1832186409" name="Title 1"/>
+          <p:cNvPr id="861534449" name="Title 1"/>
           <p:cNvSpPr>
             <a:spLocks noGrp="1"/>
           </p:cNvSpPr>
@@ -2420,7 +2850,7 @@
       </p:sp>
       <p:sp>
         <p:nvSpPr>
-          <p:cNvPr id="1157076185" name="Content Placeholder 2"/>
+          <p:cNvPr id="1392468586" name="Content Placeholder 2"/>
           <p:cNvSpPr>
             <a:spLocks noGrp="1"/>
           </p:cNvSpPr>
@@ -2486,7 +2916,7 @@
       </p:sp>
       <p:sp>
         <p:nvSpPr>
-          <p:cNvPr id="926142532" name="Date Placeholder 3"/>
+          <p:cNvPr id="1664650100" name="Date Placeholder 3"/>
           <p:cNvSpPr>
             <a:spLocks noGrp="1"/>
           </p:cNvSpPr>
@@ -2512,7 +2942,7 @@
       </p:sp>
       <p:sp>
         <p:nvSpPr>
-          <p:cNvPr id="1633925034" name="Footer Placeholder 4"/>
+          <p:cNvPr id="995142357" name="Footer Placeholder 4"/>
           <p:cNvSpPr>
             <a:spLocks noGrp="1"/>
           </p:cNvSpPr>
@@ -2534,7 +2964,7 @@
       </p:sp>
       <p:sp>
         <p:nvSpPr>
-          <p:cNvPr id="1077719219" name="Slide Number Placeholder 5"/>
+          <p:cNvPr id="349366139" name="Slide Number Placeholder 5"/>
           <p:cNvSpPr>
             <a:spLocks noGrp="1"/>
           </p:cNvSpPr>
@@ -2585,7 +3015,7 @@
       </p:grpSpPr>
       <p:sp>
         <p:nvSpPr>
-          <p:cNvPr id="249394411" name="Title 1"/>
+          <p:cNvPr id="1416407987" name="Title 1"/>
           <p:cNvSpPr>
             <a:spLocks noGrp="1"/>
           </p:cNvSpPr>
@@ -2620,7 +3050,7 @@
       </p:sp>
       <p:sp>
         <p:nvSpPr>
-          <p:cNvPr id="1093346641" name="Text Placeholder 2"/>
+          <p:cNvPr id="1101687867" name="Text Placeholder 2"/>
           <p:cNvSpPr>
             <a:spLocks noGrp="1"/>
           </p:cNvSpPr>
@@ -2742,7 +3172,7 @@
       </p:sp>
       <p:sp>
         <p:nvSpPr>
-          <p:cNvPr id="106590094" name="Date Placeholder 3"/>
+          <p:cNvPr id="1758944897" name="Date Placeholder 3"/>
           <p:cNvSpPr>
             <a:spLocks noGrp="1"/>
           </p:cNvSpPr>
@@ -2768,7 +3198,7 @@
       </p:sp>
       <p:sp>
         <p:nvSpPr>
-          <p:cNvPr id="587033629" name="Footer Placeholder 4"/>
+          <p:cNvPr id="1642528097" name="Footer Placeholder 4"/>
           <p:cNvSpPr>
             <a:spLocks noGrp="1"/>
           </p:cNvSpPr>
@@ -2790,7 +3220,7 @@
       </p:sp>
       <p:sp>
         <p:nvSpPr>
-          <p:cNvPr id="382403844" name="Slide Number Placeholder 5"/>
+          <p:cNvPr id="2054267993" name="Slide Number Placeholder 5"/>
           <p:cNvSpPr>
             <a:spLocks noGrp="1"/>
           </p:cNvSpPr>
@@ -2841,7 +3271,7 @@
       </p:grpSpPr>
       <p:sp>
         <p:nvSpPr>
-          <p:cNvPr id="1186138846" name="Title 1"/>
+          <p:cNvPr id="1824426458" name="Title 1"/>
           <p:cNvSpPr>
             <a:spLocks noGrp="1"/>
           </p:cNvSpPr>
@@ -2867,7 +3297,7 @@
       </p:sp>
       <p:sp>
         <p:nvSpPr>
-          <p:cNvPr id="649901613" name="Content Placeholder 2"/>
+          <p:cNvPr id="1063836037" name="Content Placeholder 2"/>
           <p:cNvSpPr>
             <a:spLocks noGrp="1"/>
           </p:cNvSpPr>
@@ -2938,7 +3368,7 @@
       </p:sp>
       <p:sp>
         <p:nvSpPr>
-          <p:cNvPr id="146870747" name="Content Placeholder 3"/>
+          <p:cNvPr id="631109025" name="Content Placeholder 3"/>
           <p:cNvSpPr>
             <a:spLocks noGrp="1"/>
           </p:cNvSpPr>
@@ -3009,7 +3439,7 @@
       </p:sp>
       <p:sp>
         <p:nvSpPr>
-          <p:cNvPr id="1332766991" name="Date Placeholder 4"/>
+          <p:cNvPr id="718264676" name="Date Placeholder 4"/>
           <p:cNvSpPr>
             <a:spLocks noGrp="1"/>
           </p:cNvSpPr>
@@ -3035,7 +3465,7 @@
       </p:sp>
       <p:sp>
         <p:nvSpPr>
-          <p:cNvPr id="24809298" name="Footer Placeholder 5"/>
+          <p:cNvPr id="174589683" name="Footer Placeholder 5"/>
           <p:cNvSpPr>
             <a:spLocks noGrp="1"/>
           </p:cNvSpPr>
@@ -3057,7 +3487,7 @@
       </p:sp>
       <p:sp>
         <p:nvSpPr>
-          <p:cNvPr id="1665378493" name="Slide Number Placeholder 6"/>
+          <p:cNvPr id="1705810684" name="Slide Number Placeholder 6"/>
           <p:cNvSpPr>
             <a:spLocks noGrp="1"/>
           </p:cNvSpPr>
@@ -3108,7 +3538,7 @@
       </p:grpSpPr>
       <p:sp>
         <p:nvSpPr>
-          <p:cNvPr id="1263372340" name="Title 1"/>
+          <p:cNvPr id="113510468" name="Title 1"/>
           <p:cNvSpPr>
             <a:spLocks noGrp="1"/>
           </p:cNvSpPr>
@@ -3139,7 +3569,7 @@
       </p:sp>
       <p:sp>
         <p:nvSpPr>
-          <p:cNvPr id="769125402" name="Text Placeholder 2"/>
+          <p:cNvPr id="685506205" name="Text Placeholder 2"/>
           <p:cNvSpPr>
             <a:spLocks noGrp="1"/>
           </p:cNvSpPr>
@@ -3207,7 +3637,7 @@
       </p:sp>
       <p:sp>
         <p:nvSpPr>
-          <p:cNvPr id="1957557949" name="Content Placeholder 3"/>
+          <p:cNvPr id="431538634" name="Content Placeholder 3"/>
           <p:cNvSpPr>
             <a:spLocks noGrp="1"/>
           </p:cNvSpPr>
@@ -3278,7 +3708,7 @@
       </p:sp>
       <p:sp>
         <p:nvSpPr>
-          <p:cNvPr id="371138273" name="Text Placeholder 4"/>
+          <p:cNvPr id="1956452181" name="Text Placeholder 4"/>
           <p:cNvSpPr>
             <a:spLocks noGrp="1"/>
           </p:cNvSpPr>
@@ -3346,7 +3776,7 @@
       </p:sp>
       <p:sp>
         <p:nvSpPr>
-          <p:cNvPr id="951096522" name="Content Placeholder 5"/>
+          <p:cNvPr id="17467106" name="Content Placeholder 5"/>
           <p:cNvSpPr>
             <a:spLocks noGrp="1"/>
           </p:cNvSpPr>
@@ -3417,7 +3847,7 @@
       </p:sp>
       <p:sp>
         <p:nvSpPr>
-          <p:cNvPr id="1222232587" name="Date Placeholder 6"/>
+          <p:cNvPr id="238729592" name="Date Placeholder 6"/>
           <p:cNvSpPr>
             <a:spLocks noGrp="1"/>
           </p:cNvSpPr>
@@ -3443,7 +3873,7 @@
       </p:sp>
       <p:sp>
         <p:nvSpPr>
-          <p:cNvPr id="539036354" name="Footer Placeholder 7"/>
+          <p:cNvPr id="1941692307" name="Footer Placeholder 7"/>
           <p:cNvSpPr>
             <a:spLocks noGrp="1"/>
           </p:cNvSpPr>
@@ -3465,7 +3895,7 @@
       </p:sp>
       <p:sp>
         <p:nvSpPr>
-          <p:cNvPr id="1768790982" name="Slide Number Placeholder 8"/>
+          <p:cNvPr id="1817800732" name="Slide Number Placeholder 8"/>
           <p:cNvSpPr>
             <a:spLocks noGrp="1"/>
           </p:cNvSpPr>
@@ -3516,7 +3946,7 @@
       </p:grpSpPr>
       <p:sp>
         <p:nvSpPr>
-          <p:cNvPr id="1697067027" name="Title 1"/>
+          <p:cNvPr id="1368161716" name="Title 1"/>
           <p:cNvSpPr>
             <a:spLocks noGrp="1"/>
           </p:cNvSpPr>
@@ -3542,7 +3972,7 @@
       </p:sp>
       <p:sp>
         <p:nvSpPr>
-          <p:cNvPr id="1357003026" name="Date Placeholder 2"/>
+          <p:cNvPr id="1185172387" name="Date Placeholder 2"/>
           <p:cNvSpPr>
             <a:spLocks noGrp="1"/>
           </p:cNvSpPr>
@@ -3568,7 +3998,7 @@
       </p:sp>
       <p:sp>
         <p:nvSpPr>
-          <p:cNvPr id="1122626274" name="Footer Placeholder 3"/>
+          <p:cNvPr id="1522239270" name="Footer Placeholder 3"/>
           <p:cNvSpPr>
             <a:spLocks noGrp="1"/>
           </p:cNvSpPr>
@@ -3590,7 +4020,7 @@
       </p:sp>
       <p:sp>
         <p:nvSpPr>
-          <p:cNvPr id="1522420894" name="Slide Number Placeholder 4"/>
+          <p:cNvPr id="204398188" name="Slide Number Placeholder 4"/>
           <p:cNvSpPr>
             <a:spLocks noGrp="1"/>
           </p:cNvSpPr>
@@ -3641,7 +4071,7 @@
       </p:grpSpPr>
       <p:sp>
         <p:nvSpPr>
-          <p:cNvPr id="709010437" name="Date Placeholder 1"/>
+          <p:cNvPr id="2004242902" name="Date Placeholder 1"/>
           <p:cNvSpPr>
             <a:spLocks noGrp="1"/>
           </p:cNvSpPr>
@@ -3667,7 +4097,7 @@
       </p:sp>
       <p:sp>
         <p:nvSpPr>
-          <p:cNvPr id="379791156" name="Footer Placeholder 2"/>
+          <p:cNvPr id="786422493" name="Footer Placeholder 2"/>
           <p:cNvSpPr>
             <a:spLocks noGrp="1"/>
           </p:cNvSpPr>
@@ -3689,7 +4119,7 @@
       </p:sp>
       <p:sp>
         <p:nvSpPr>
-          <p:cNvPr id="1334252171" name="Slide Number Placeholder 3"/>
+          <p:cNvPr id="169960290" name="Slide Number Placeholder 3"/>
           <p:cNvSpPr>
             <a:spLocks noGrp="1"/>
           </p:cNvSpPr>
@@ -3740,7 +4170,7 @@
       </p:grpSpPr>
       <p:sp>
         <p:nvSpPr>
-          <p:cNvPr id="207088258" name="Title 1"/>
+          <p:cNvPr id="1719136735" name="Title 1"/>
           <p:cNvSpPr>
             <a:spLocks noGrp="1"/>
           </p:cNvSpPr>
@@ -3775,7 +4205,7 @@
       </p:sp>
       <p:sp>
         <p:nvSpPr>
-          <p:cNvPr id="1349753560" name="Content Placeholder 2"/>
+          <p:cNvPr id="179899670" name="Content Placeholder 2"/>
           <p:cNvSpPr>
             <a:spLocks noGrp="1"/>
           </p:cNvSpPr>
@@ -3874,7 +4304,7 @@
       </p:sp>
       <p:sp>
         <p:nvSpPr>
-          <p:cNvPr id="1125577889" name="Text Placeholder 3"/>
+          <p:cNvPr id="105745055" name="Text Placeholder 3"/>
           <p:cNvSpPr>
             <a:spLocks noGrp="1"/>
           </p:cNvSpPr>
@@ -3942,7 +4372,7 @@
       </p:sp>
       <p:sp>
         <p:nvSpPr>
-          <p:cNvPr id="1586888020" name="Date Placeholder 4"/>
+          <p:cNvPr id="1079611017" name="Date Placeholder 4"/>
           <p:cNvSpPr>
             <a:spLocks noGrp="1"/>
           </p:cNvSpPr>
@@ -3968,7 +4398,7 @@
       </p:sp>
       <p:sp>
         <p:nvSpPr>
-          <p:cNvPr id="1041009387" name="Footer Placeholder 5"/>
+          <p:cNvPr id="723568105" name="Footer Placeholder 5"/>
           <p:cNvSpPr>
             <a:spLocks noGrp="1"/>
           </p:cNvSpPr>
@@ -3990,7 +4420,7 @@
       </p:sp>
       <p:sp>
         <p:nvSpPr>
-          <p:cNvPr id="793690728" name="Slide Number Placeholder 6"/>
+          <p:cNvPr id="97672923" name="Slide Number Placeholder 6"/>
           <p:cNvSpPr>
             <a:spLocks noGrp="1"/>
           </p:cNvSpPr>
@@ -4041,7 +4471,7 @@
       </p:grpSpPr>
       <p:sp>
         <p:nvSpPr>
-          <p:cNvPr id="987135520" name="Title 1"/>
+          <p:cNvPr id="151820937" name="Title 1"/>
           <p:cNvSpPr>
             <a:spLocks noGrp="1"/>
           </p:cNvSpPr>
@@ -4076,7 +4506,7 @@
       </p:sp>
       <p:sp>
         <p:nvSpPr>
-          <p:cNvPr id="201047570" name="Picture Placeholder 2"/>
+          <p:cNvPr id="1286952142" name="Picture Placeholder 2"/>
           <p:cNvSpPr>
             <a:spLocks noChangeAspect="1" noGrp="1"/>
           </p:cNvSpPr>
@@ -4144,7 +4574,7 @@
       </p:sp>
       <p:sp>
         <p:nvSpPr>
-          <p:cNvPr id="579124144" name="Text Placeholder 3"/>
+          <p:cNvPr id="273897399" name="Text Placeholder 3"/>
           <p:cNvSpPr>
             <a:spLocks noGrp="1"/>
           </p:cNvSpPr>
@@ -4212,7 +4642,7 @@
       </p:sp>
       <p:sp>
         <p:nvSpPr>
-          <p:cNvPr id="811390353" name="Date Placeholder 4"/>
+          <p:cNvPr id="1955991357" name="Date Placeholder 4"/>
           <p:cNvSpPr>
             <a:spLocks noGrp="1"/>
           </p:cNvSpPr>
@@ -4238,7 +4668,7 @@
       </p:sp>
       <p:sp>
         <p:nvSpPr>
-          <p:cNvPr id="1999060828" name="Footer Placeholder 5"/>
+          <p:cNvPr id="354199897" name="Footer Placeholder 5"/>
           <p:cNvSpPr>
             <a:spLocks noGrp="1"/>
           </p:cNvSpPr>
@@ -4260,7 +4690,7 @@
       </p:sp>
       <p:sp>
         <p:nvSpPr>
-          <p:cNvPr id="320442893" name="Slide Number Placeholder 6"/>
+          <p:cNvPr id="1255026199" name="Slide Number Placeholder 6"/>
           <p:cNvSpPr>
             <a:spLocks noGrp="1"/>
           </p:cNvSpPr>
@@ -4316,7 +4746,7 @@
       </p:grpSpPr>
       <p:sp>
         <p:nvSpPr>
-          <p:cNvPr id="2019285619" name="Title Placeholder 1"/>
+          <p:cNvPr id="110323823" name="Title Placeholder 1"/>
           <p:cNvSpPr>
             <a:spLocks noGrp="1"/>
           </p:cNvSpPr>
@@ -4352,7 +4782,7 @@
       </p:sp>
       <p:sp>
         <p:nvSpPr>
-          <p:cNvPr id="571481333" name="Text Placeholder 2"/>
+          <p:cNvPr id="1900719426" name="Text Placeholder 2"/>
           <p:cNvSpPr>
             <a:spLocks noGrp="1"/>
           </p:cNvSpPr>
@@ -4428,7 +4858,7 @@
       </p:sp>
       <p:sp>
         <p:nvSpPr>
-          <p:cNvPr id="777171412" name="Date Placeholder 3"/>
+          <p:cNvPr id="2121039508" name="Date Placeholder 3"/>
           <p:cNvSpPr>
             <a:spLocks noGrp="1"/>
           </p:cNvSpPr>
@@ -4472,7 +4902,7 @@
       </p:sp>
       <p:sp>
         <p:nvSpPr>
-          <p:cNvPr id="1586652364" name="Footer Placeholder 4"/>
+          <p:cNvPr id="1501123606" name="Footer Placeholder 4"/>
           <p:cNvSpPr>
             <a:spLocks noGrp="1"/>
           </p:cNvSpPr>
@@ -4512,7 +4942,7 @@
       </p:sp>
       <p:sp>
         <p:nvSpPr>
-          <p:cNvPr id="1935814656" name="Slide Number Placeholder 5"/>
+          <p:cNvPr id="799128661" name="Slide Number Placeholder 5"/>
           <p:cNvSpPr>
             <a:spLocks noGrp="1"/>
           </p:cNvSpPr>
@@ -4872,7 +5302,7 @@
       </p:grpSpPr>
       <p:sp>
         <p:nvSpPr>
-          <p:cNvPr id="10007774" name="Title 1"/>
+          <p:cNvPr id="1035695642" name="Title 1"/>
           <p:cNvSpPr>
             <a:spLocks noGrp="1"/>
           </p:cNvSpPr>
@@ -4898,7 +5328,7 @@
       </p:sp>
       <p:sp>
         <p:nvSpPr>
-          <p:cNvPr id="1488309491" name="Subtitle 2"/>
+          <p:cNvPr id="1185863693" name="Subtitle 2"/>
           <p:cNvSpPr>
             <a:spLocks noGrp="1"/>
           </p:cNvSpPr>
@@ -5406,7 +5836,7 @@
       </p:graphicFrame>
       <p:pic>
         <p:nvPicPr>
-          <p:cNvPr id="393106264" name=""/>
+          <p:cNvPr id="1653924354" name=""/>
           <p:cNvPicPr>
             <a:picLocks noChangeAspect="1"/>
           </p:cNvPicPr>
@@ -5418,8 +5848,8 @@
         </p:blipFill>
         <p:spPr bwMode="auto">
           <a:xfrm flipH="0" flipV="0">
-            <a:off x="2621808" y="2741773"/>
-            <a:ext cx="6851358" cy="4075774"/>
+            <a:off x="2410799" y="2750729"/>
+            <a:ext cx="6915150" cy="4113722"/>
           </a:xfrm>
           <a:prstGeom prst="rect">
             <a:avLst/>
@@ -5714,7 +6144,7 @@
       </p:sp>
       <p:pic>
         <p:nvPicPr>
-          <p:cNvPr id="1661534957" name=""/>
+          <p:cNvPr id="569097536" name=""/>
           <p:cNvPicPr>
             <a:picLocks noChangeAspect="1"/>
           </p:cNvPicPr>
@@ -5725,9 +6155,9 @@
           <a:stretch/>
         </p:blipFill>
         <p:spPr bwMode="auto">
-          <a:xfrm>
-            <a:off x="0" y="2853520"/>
-            <a:ext cx="12191999" cy="4003994"/>
+          <a:xfrm flipH="0" flipV="0">
+            <a:off x="25399" y="2727324"/>
+            <a:ext cx="12126574" cy="3982508"/>
           </a:xfrm>
           <a:prstGeom prst="rect">
             <a:avLst/>
@@ -6043,8 +6473,12 @@
               <a:defRPr/>
             </a:pPr>
             <a:r>
+              <a:rPr b="1" u="sng"/>
+              <a:t>Non-ML</a:t>
+            </a:r>
+            <a:r>
               <a:rPr b="1"/>
-              <a:t>Non-ML </a:t>
+              <a:t> </a:t>
             </a:r>
             <a:r>
               <a:rPr/>
@@ -6214,7 +6648,7 @@
       </p:grpSpPr>
       <p:sp>
         <p:nvSpPr>
-          <p:cNvPr id="1958357340" name="Title 1"/>
+          <p:cNvPr id="1433673269" name="Title 1"/>
           <p:cNvSpPr>
             <a:spLocks noGrp="1"/>
           </p:cNvSpPr>
@@ -6227,117 +6661,386 @@
           <a:bodyPr/>
           <a:lstStyle/>
           <a:p>
-            <a:pPr marL="0" marR="0" lvl="0" indent="0" algn="l" defTabSz="914400" rtl="0">
-              <a:lnSpc>
-                <a:spcPct val="90000"/>
-              </a:lnSpc>
-              <a:spcBef>
-                <a:spcPts val="0"/>
-              </a:spcBef>
-              <a:spcAft>
-                <a:spcPts val="0"/>
-              </a:spcAft>
+            <a:pPr>
+              <a:defRPr/>
+            </a:pPr>
+            <a:r>
+              <a:rPr/>
+              <a:t>First more data cleaning needed</a:t>
+            </a:r>
+            <a:endParaRPr/>
+          </a:p>
+        </p:txBody>
+      </p:sp>
+      <p:sp>
+        <p:nvSpPr>
+          <p:cNvPr id="901313802" name="Content Placeholder 2"/>
+          <p:cNvSpPr>
+            <a:spLocks noGrp="1"/>
+          </p:cNvSpPr>
+          <p:nvPr>
+            <p:ph idx="1"/>
+          </p:nvPr>
+        </p:nvSpPr>
+        <p:spPr bwMode="auto">
+          <a:xfrm flipH="0" flipV="0">
+            <a:off x="838199" y="4233333"/>
+            <a:ext cx="10515600" cy="1943629"/>
+          </a:xfrm>
+        </p:spPr>
+        <p:txBody>
+          <a:bodyPr vertOverflow="overflow" horzOverflow="overflow" vert="horz" wrap="square" lIns="91440" tIns="45720" rIns="91440" bIns="45720" numCol="1" spcCol="0" rtlCol="0" fromWordArt="0" anchor="t" anchorCtr="0" forceAA="0" upright="0" compatLnSpc="0">
+            <a:normAutofit/>
+          </a:bodyPr>
+          <a:lstStyle/>
+          <a:p>
+            <a:pPr marL="0" indent="0">
+              <a:buFont typeface="Arial"/>
               <a:buNone/>
-              <a:defRPr lang="en-GB" sz="4400" b="0" i="0" u="none" strike="noStrike" cap="none" spc="0">
+              <a:defRPr/>
+            </a:pPr>
+            <a:r>
+              <a:rPr lang="en-GB" sz="2800" b="1" i="0" u="sng" strike="noStrike" cap="none" spc="0">
                 <a:solidFill>
-                  <a:srgbClr val="000000"/>
-                </a:solidFill>
-                <a:latin typeface="Arial"/>
-                <a:ea typeface="Arial"/>
-                <a:cs typeface="Arial"/>
-              </a:defRPr>
-            </a:pPr>
-            <a:r>
-              <a:rPr lang="en-GB" sz="2800" b="1" i="0" u="none" strike="noStrike" cap="none" spc="0">
-                <a:solidFill>
-                  <a:srgbClr val="000000"/>
+                  <a:schemeClr val="tx1"/>
                 </a:solidFill>
                 <a:latin typeface="Arial"/>
                 <a:ea typeface="Arial"/>
                 <a:cs typeface="Arial"/>
               </a:rPr>
-              <a:t>Q3:</a:t>
-            </a:r>
-            <a:r>
-              <a:rPr lang="en-GB" sz="2800" b="0" i="0" u="none" strike="noStrike" cap="none" spc="0">
+              <a:t>Clean samples:</a:t>
+            </a:r>
+            <a:r>
+              <a:rPr lang="en-GB" sz="2800" b="1" i="0" u="none" strike="noStrike" cap="none" spc="0">
                 <a:solidFill>
-                  <a:srgbClr val="000000"/>
+                  <a:schemeClr val="tx1"/>
                 </a:solidFill>
                 <a:latin typeface="Arial"/>
                 <a:ea typeface="Arial"/>
                 <a:cs typeface="Arial"/>
               </a:rPr>
-              <a:t> </a:t>
+              <a:t> 1121</a:t>
             </a:r>
             <a:r>
               <a:rPr lang="en-GB" sz="2800" b="0" i="0" u="none" strike="noStrike" cap="none" spc="0">
                 <a:solidFill>
-                  <a:srgbClr val="000000"/>
+                  <a:schemeClr val="tx1"/>
                 </a:solidFill>
                 <a:latin typeface="Arial"/>
                 <a:ea typeface="Arial"/>
                 <a:cs typeface="Arial"/>
               </a:rPr>
-              <a:t>What factors impact the time it takes to get pregnant?</a:t>
-            </a:r>
-            <a:endParaRPr sz="2800"/>
-          </a:p>
-        </p:txBody>
-      </p:sp>
-      <p:sp>
-        <p:nvSpPr>
-          <p:cNvPr id="254885853" name="Content Placeholder 2"/>
-          <p:cNvSpPr>
-            <a:spLocks noGrp="1"/>
-          </p:cNvSpPr>
-          <p:nvPr>
-            <p:ph idx="1"/>
-          </p:nvPr>
-        </p:nvSpPr>
-        <p:spPr bwMode="auto"/>
-        <p:txBody>
-          <a:bodyPr/>
-          <a:lstStyle/>
-          <a:p>
-            <a:pPr>
-              <a:defRPr/>
-            </a:pPr>
+              <a:t> (out of</a:t>
+            </a:r>
             <a:r>
               <a:rPr/>
-              <a:t>Exclude country: while country/cultural effects are interesting, but collected data does not cater towards this</a:t>
-            </a:r>
-            <a:endParaRPr/>
-          </a:p>
-          <a:p>
-            <a:pPr>
-              <a:defRPr/>
-            </a:pPr>
-            <a:endParaRPr/>
-          </a:p>
-        </p:txBody>
-      </p:sp>
-      <p:pic>
-        <p:nvPicPr>
-          <p:cNvPr id="1540222781" name=""/>
-          <p:cNvPicPr>
-            <a:picLocks noChangeAspect="1"/>
-          </p:cNvPicPr>
+              <a:t> 1995)</a:t>
+            </a:r>
+            <a:endParaRPr/>
+          </a:p>
+        </p:txBody>
+      </p:sp>
+      <p:graphicFrame>
+        <p:nvGraphicFramePr>
+          <p:cNvPr id="481122543" name=""/>
+          <p:cNvGraphicFramePr>
+            <a:graphicFrameLocks xmlns:a="http://schemas.openxmlformats.org/drawingml/2006/main"/>
+          </p:cNvGraphicFramePr>
           <p:nvPr/>
-        </p:nvPicPr>
-        <p:blipFill>
-          <a:blip r:embed="rId3"/>
-          <a:stretch/>
-        </p:blipFill>
-        <p:spPr bwMode="auto">
-          <a:xfrm flipH="0" flipV="0">
-            <a:off x="5049225" y="2577976"/>
-            <a:ext cx="6908985" cy="4128497"/>
-          </a:xfrm>
-          <a:prstGeom prst="rect">
-            <a:avLst/>
-          </a:prstGeom>
-        </p:spPr>
-      </p:pic>
+        </p:nvGraphicFramePr>
+        <p:xfrm>
+          <a:off x="685799" y="1690687"/>
+          <a:ext cx="10667999" cy="2069167"/>
+        </p:xfrm>
+        <a:graphic>
+          <a:graphicData uri="http://schemas.openxmlformats.org/drawingml/2006/table">
+            <a:tbl>
+              <a:tblPr firstRow="1" firstCol="0" lastRow="0" lastCol="0" bandRow="1" bandCol="0">
+                <a:tableStyleId>{B301B821-A1FF-4177-AEE7-76D212191A09}</a:tableStyleId>
+              </a:tblPr>
+              <a:tblGrid>
+                <a:gridCol w="5327649"/>
+                <a:gridCol w="5327649"/>
+              </a:tblGrid>
+              <a:tr h="269736">
+                <a:tc>
+                  <a:txBody>
+                    <a:bodyPr/>
+                    <a:p>
+                      <a:pPr>
+                        <a:defRPr/>
+                      </a:pPr>
+                      <a:r>
+                        <a:rPr sz="1600"/>
+                        <a:t>Removed:</a:t>
+                      </a:r>
+                      <a:endParaRPr sz="1600"/>
+                    </a:p>
+                  </a:txBody>
+                  <a:tcPr/>
+                </a:tc>
+                <a:tc>
+                  <a:txBody>
+                    <a:bodyPr/>
+                    <a:p>
+                      <a:pPr>
+                        <a:defRPr/>
+                      </a:pPr>
+                      <a:r>
+                        <a:rPr sz="1600"/>
+                        <a:t>Why</a:t>
+                      </a:r>
+                      <a:endParaRPr sz="1600"/>
+                    </a:p>
+                  </a:txBody>
+                  <a:tcPr/>
+                </a:tc>
+              </a:tr>
+              <a:tr h="289425">
+                <a:tc>
+                  <a:txBody>
+                    <a:bodyPr/>
+                    <a:p>
+                      <a:pPr lvl="1">
+                        <a:defRPr/>
+                      </a:pPr>
+                      <a:r>
+                        <a:rPr lang="en-GB" sz="1600" b="0" i="0" u="none" strike="noStrike" cap="none" spc="0">
+                          <a:solidFill>
+                            <a:schemeClr val="dk1"/>
+                          </a:solidFill>
+                          <a:latin typeface="+mn-lt"/>
+                          <a:ea typeface="+mn-ea"/>
+                          <a:cs typeface="+mn-cs"/>
+                        </a:rPr>
+                        <a:t>Non-pregnant participants</a:t>
+                      </a:r>
+                      <a:r>
+                        <a:rPr lang="en-GB" sz="1600" b="0" i="0" u="none" strike="noStrike" cap="none" spc="0">
+                          <a:solidFill>
+                            <a:schemeClr val="dk1"/>
+                          </a:solidFill>
+                          <a:latin typeface="+mn-lt"/>
+                          <a:ea typeface="+mn-ea"/>
+                          <a:cs typeface="+mn-cs"/>
+                        </a:rPr>
+                        <a:t> </a:t>
+                      </a:r>
+                      <a:endParaRPr sz="1600"/>
+                    </a:p>
+                  </a:txBody>
+                  <a:tcPr/>
+                </a:tc>
+                <a:tc>
+                  <a:txBody>
+                    <a:bodyPr/>
+                    <a:p>
+                      <a:pPr>
+                        <a:defRPr/>
+                      </a:pPr>
+                      <a:r>
+                        <a:rPr sz="1600"/>
+                        <a:t>We want to know how quickly, not IF they got pregnant.</a:t>
+                      </a:r>
+                      <a:endParaRPr sz="1600"/>
+                    </a:p>
+                  </a:txBody>
+                  <a:tcPr/>
+                </a:tc>
+              </a:tr>
+              <a:tr h="357674">
+                <a:tc>
+                  <a:txBody>
+                    <a:bodyPr/>
+                    <a:p>
+                      <a:pPr lvl="1">
+                        <a:defRPr/>
+                      </a:pPr>
+                      <a:r>
+                        <a:rPr lang="en-GB" sz="1600" b="0" i="0" u="none" strike="noStrike" cap="none" spc="0">
+                          <a:solidFill>
+                            <a:schemeClr val="tx1"/>
+                          </a:solidFill>
+                          <a:latin typeface="Arial"/>
+                          <a:ea typeface="Arial"/>
+                          <a:cs typeface="Arial"/>
+                        </a:rPr>
+                        <a:t>Pregnant participants with </a:t>
+                      </a:r>
+                      <a:r>
+                        <a:rPr lang="en-GB" sz="1600" b="0" i="0" u="none" strike="noStrike" cap="none" spc="0">
+                          <a:solidFill>
+                            <a:schemeClr val="dk1"/>
+                          </a:solidFill>
+                          <a:latin typeface="+mn-lt"/>
+                          <a:ea typeface="+mn-ea"/>
+                          <a:cs typeface="+mn-cs"/>
+                        </a:rPr>
+                        <a:t>intercourse frequency 0</a:t>
+                      </a:r>
+                      <a:endParaRPr sz="1600"/>
+                    </a:p>
+                  </a:txBody>
+                  <a:tcPr/>
+                </a:tc>
+                <a:tc>
+                  <a:txBody>
+                    <a:bodyPr/>
+                    <a:p>
+                      <a:pPr>
+                        <a:defRPr/>
+                      </a:pPr>
+                      <a:r>
+                        <a:rPr sz="1600"/>
+                        <a:t>Can’t get pregnant without sexual intercourse.</a:t>
+                      </a:r>
+                      <a:endParaRPr sz="1600"/>
+                    </a:p>
+                  </a:txBody>
+                  <a:tcPr/>
+                </a:tc>
+              </a:tr>
+              <a:tr h="269736">
+                <a:tc>
+                  <a:txBody>
+                    <a:bodyPr/>
+                    <a:p>
+                      <a:pPr lvl="1">
+                        <a:defRPr/>
+                      </a:pPr>
+                      <a:r>
+                        <a:rPr lang="en-GB" sz="1600" b="0" i="0" u="none" strike="noStrike" cap="none" spc="0">
+                          <a:solidFill>
+                            <a:schemeClr val="dk1"/>
+                          </a:solidFill>
+                          <a:latin typeface="+mn-lt"/>
+                          <a:ea typeface="+mn-ea"/>
+                          <a:cs typeface="+mn-cs"/>
+                        </a:rPr>
+                        <a:t>BMI &lt; 12</a:t>
+                      </a:r>
+                      <a:endParaRPr sz="1600"/>
+                    </a:p>
+                  </a:txBody>
+                  <a:tcPr/>
+                </a:tc>
+                <a:tc>
+                  <a:txBody>
+                    <a:bodyPr/>
+                    <a:p>
+                      <a:pPr>
+                        <a:defRPr/>
+                      </a:pPr>
+                      <a:r>
+                        <a:rPr lang="en-GB" sz="1600" b="0" i="0" u="none" strike="noStrike" cap="none" spc="0">
+                          <a:solidFill>
+                            <a:schemeClr val="tx1"/>
+                          </a:solidFill>
+                          <a:latin typeface="Arial"/>
+                          <a:ea typeface="Arial"/>
+                          <a:cs typeface="Arial"/>
+                        </a:rPr>
+                        <a:t>Unrealistic value</a:t>
+                      </a:r>
+                      <a:endParaRPr sz="1600"/>
+                    </a:p>
+                  </a:txBody>
+                  <a:tcPr/>
+                </a:tc>
+              </a:tr>
+              <a:tr h="269736">
+                <a:tc>
+                  <a:txBody>
+                    <a:bodyPr/>
+                    <a:p>
+                      <a:pPr lvl="1">
+                        <a:defRPr/>
+                      </a:pPr>
+                      <a:r>
+                        <a:rPr lang="en-GB" sz="1600" b="0" i="0" u="none" strike="noStrike" cap="none" spc="0">
+                          <a:solidFill>
+                            <a:schemeClr val="dk1"/>
+                          </a:solidFill>
+                          <a:latin typeface="+mn-lt"/>
+                          <a:ea typeface="+mn-ea"/>
+                          <a:cs typeface="+mn-cs"/>
+                        </a:rPr>
+                        <a:t>Dedication &gt; 1.00 </a:t>
+                      </a:r>
+                      <a:endParaRPr sz="1600"/>
+                    </a:p>
+                  </a:txBody>
+                  <a:tcPr/>
+                </a:tc>
+                <a:tc>
+                  <a:txBody>
+                    <a:bodyPr/>
+                    <a:p>
+                      <a:pPr>
+                        <a:defRPr/>
+                      </a:pPr>
+                      <a:r>
+                        <a:rPr lang="en-GB" sz="1600" b="0" i="0" u="none" strike="noStrike" cap="none" spc="0">
+                          <a:solidFill>
+                            <a:schemeClr val="dk1"/>
+                          </a:solidFill>
+                          <a:latin typeface="Arial"/>
+                          <a:ea typeface="Arial"/>
+                          <a:cs typeface="Arial"/>
+                        </a:rPr>
+                        <a:t>You can’t log more than 100% of days</a:t>
+                      </a:r>
+                      <a:endParaRPr sz="1600"/>
+                    </a:p>
+                  </a:txBody>
+                  <a:tcPr/>
+                </a:tc>
+              </a:tr>
+              <a:tr h="357674">
+                <a:tc>
+                  <a:txBody>
+                    <a:bodyPr/>
+                    <a:p>
+                      <a:pPr lvl="1">
+                        <a:defRPr/>
+                      </a:pPr>
+                      <a:r>
+                        <a:rPr lang="en-GB" sz="1600" b="0" i="0" u="none" strike="noStrike" cap="none" spc="0">
+                          <a:solidFill>
+                            <a:schemeClr val="dk1"/>
+                          </a:solidFill>
+                          <a:latin typeface="+mn-lt"/>
+                          <a:ea typeface="+mn-ea"/>
+                          <a:cs typeface="+mn-cs"/>
+                        </a:rPr>
+                        <a:t>Remove samples with NaN’s / empty values</a:t>
+                      </a:r>
+                      <a:endParaRPr sz="1600"/>
+                    </a:p>
+                  </a:txBody>
+                  <a:tcPr/>
+                </a:tc>
+                <a:tc>
+                  <a:txBody>
+                    <a:bodyPr/>
+                    <a:p>
+                      <a:pPr>
+                        <a:defRPr/>
+                      </a:pPr>
+                      <a:r>
+                        <a:rPr sz="1600"/>
+                        <a:t>We want to investigate all parameters</a:t>
+                      </a:r>
+                      <a:endParaRPr sz="1600"/>
+                    </a:p>
+                  </a:txBody>
+                  <a:tcPr/>
+                </a:tc>
+              </a:tr>
+            </a:tbl>
+          </a:graphicData>
+        </a:graphic>
+      </p:graphicFrame>
     </p:spTree>
   </p:cSld>
   <p:clrMapOvr>
@@ -6373,6 +7076,855 @@
       </p:grpSpPr>
       <p:sp>
         <p:nvSpPr>
+          <p:cNvPr id="1958357340" name="Title 1"/>
+          <p:cNvSpPr>
+            <a:spLocks noGrp="1"/>
+          </p:cNvSpPr>
+          <p:nvPr>
+            <p:ph type="title"/>
+          </p:nvPr>
+        </p:nvSpPr>
+        <p:spPr bwMode="auto">
+          <a:xfrm flipH="0" flipV="0">
+            <a:off x="933449" y="248708"/>
+            <a:ext cx="10515600" cy="640291"/>
+          </a:xfrm>
+        </p:spPr>
+        <p:txBody>
+          <a:bodyPr/>
+          <a:lstStyle/>
+          <a:p>
+            <a:pPr marL="0" marR="0" lvl="0" indent="0" algn="l" defTabSz="914400" rtl="0">
+              <a:lnSpc>
+                <a:spcPct val="90000"/>
+              </a:lnSpc>
+              <a:spcBef>
+                <a:spcPts val="0"/>
+              </a:spcBef>
+              <a:spcAft>
+                <a:spcPts val="0"/>
+              </a:spcAft>
+              <a:buNone/>
+              <a:defRPr lang="en-GB" sz="4400" b="0" i="0" u="none" strike="noStrike" cap="none" spc="0">
+                <a:solidFill>
+                  <a:srgbClr val="000000"/>
+                </a:solidFill>
+                <a:latin typeface="Arial"/>
+                <a:ea typeface="Arial"/>
+                <a:cs typeface="Arial"/>
+              </a:defRPr>
+            </a:pPr>
+            <a:r>
+              <a:rPr lang="en-GB" sz="2800" b="0" i="0" u="none" strike="noStrike" cap="none" spc="0">
+                <a:solidFill>
+                  <a:srgbClr val="000000"/>
+                </a:solidFill>
+                <a:latin typeface="Arial"/>
+                <a:ea typeface="Arial"/>
+                <a:cs typeface="Arial"/>
+              </a:rPr>
+              <a:t>Simple binning in groups already shows some potential effects</a:t>
+            </a:r>
+            <a:endParaRPr sz="2800"/>
+          </a:p>
+        </p:txBody>
+      </p:sp>
+      <p:pic>
+        <p:nvPicPr>
+          <p:cNvPr id="105255818" name=""/>
+          <p:cNvPicPr>
+            <a:picLocks noChangeAspect="1"/>
+          </p:cNvPicPr>
+          <p:nvPr/>
+        </p:nvPicPr>
+        <p:blipFill>
+          <a:blip r:embed="rId3"/>
+          <a:stretch/>
+        </p:blipFill>
+        <p:spPr bwMode="auto">
+          <a:xfrm flipH="0" flipV="0">
+            <a:off x="1490710" y="888999"/>
+            <a:ext cx="9821012" cy="5979583"/>
+          </a:xfrm>
+          <a:prstGeom prst="rect">
+            <a:avLst/>
+          </a:prstGeom>
+        </p:spPr>
+      </p:pic>
+      <p:sp>
+        <p:nvSpPr>
+          <p:cNvPr id="1907888926" name=""/>
+          <p:cNvSpPr/>
+          <p:nvPr/>
+        </p:nvSpPr>
+        <p:spPr bwMode="auto">
+          <a:xfrm rot="0" flipH="0" flipV="0">
+            <a:off x="1514499" y="920749"/>
+            <a:ext cx="2487083" cy="2487083"/>
+          </a:xfrm>
+          <a:prstGeom prst="flowChartAlternateProcess">
+            <a:avLst/>
+          </a:prstGeom>
+          <a:noFill/>
+          <a:ln w="28575" cap="flat" cmpd="sng" algn="ctr">
+            <a:solidFill>
+              <a:schemeClr val="accent6">
+                <a:lumMod val="50196"/>
+              </a:schemeClr>
+            </a:solidFill>
+            <a:prstDash val="solid"/>
+            <a:miter lim="800000"/>
+          </a:ln>
+        </p:spPr>
+        <p:style>
+          <a:lnRef idx="2">
+            <a:schemeClr val="accent1">
+              <a:shade val="50000"/>
+            </a:schemeClr>
+          </a:lnRef>
+          <a:fillRef idx="1">
+            <a:schemeClr val="accent1"/>
+          </a:fillRef>
+          <a:effectRef idx="0">
+            <a:schemeClr val="accent1"/>
+          </a:effectRef>
+          <a:fontRef idx="minor">
+            <a:schemeClr val="lt1"/>
+          </a:fontRef>
+        </p:style>
+      </p:sp>
+      <p:sp>
+        <p:nvSpPr>
+          <p:cNvPr id="1050077941" name=""/>
+          <p:cNvSpPr/>
+          <p:nvPr/>
+        </p:nvSpPr>
+        <p:spPr bwMode="auto">
+          <a:xfrm rot="0" flipH="0" flipV="0">
+            <a:off x="1427050" y="3767666"/>
+            <a:ext cx="2574532" cy="2709333"/>
+          </a:xfrm>
+          <a:prstGeom prst="flowChartAlternateProcess">
+            <a:avLst/>
+          </a:prstGeom>
+          <a:noFill/>
+          <a:ln w="28575" cap="flat" cmpd="sng" algn="ctr">
+            <a:solidFill>
+              <a:schemeClr val="accent6">
+                <a:lumMod val="50196"/>
+              </a:schemeClr>
+            </a:solidFill>
+            <a:prstDash val="solid"/>
+            <a:miter lim="800000"/>
+          </a:ln>
+        </p:spPr>
+        <p:style>
+          <a:lnRef idx="2">
+            <a:schemeClr val="accent1">
+              <a:shade val="50000"/>
+            </a:schemeClr>
+          </a:lnRef>
+          <a:fillRef idx="1">
+            <a:schemeClr val="accent1"/>
+          </a:fillRef>
+          <a:effectRef idx="0">
+            <a:schemeClr val="accent1"/>
+          </a:effectRef>
+          <a:fontRef idx="minor">
+            <a:schemeClr val="lt1"/>
+          </a:fontRef>
+        </p:style>
+      </p:sp>
+      <p:sp>
+        <p:nvSpPr>
+          <p:cNvPr id="1187886406" name=""/>
+          <p:cNvSpPr/>
+          <p:nvPr/>
+        </p:nvSpPr>
+        <p:spPr bwMode="auto">
+          <a:xfrm rot="0" flipH="0" flipV="0">
+            <a:off x="3914133" y="3767666"/>
+            <a:ext cx="2574532" cy="2709333"/>
+          </a:xfrm>
+          <a:prstGeom prst="flowChartAlternateProcess">
+            <a:avLst/>
+          </a:prstGeom>
+          <a:noFill/>
+          <a:ln w="28575" cap="flat" cmpd="sng" algn="ctr">
+            <a:solidFill>
+              <a:schemeClr val="accent6">
+                <a:lumMod val="50196"/>
+              </a:schemeClr>
+            </a:solidFill>
+            <a:prstDash val="solid"/>
+            <a:miter lim="800000"/>
+          </a:ln>
+        </p:spPr>
+        <p:style>
+          <a:lnRef idx="2">
+            <a:schemeClr val="accent1">
+              <a:shade val="50000"/>
+            </a:schemeClr>
+          </a:lnRef>
+          <a:fillRef idx="1">
+            <a:schemeClr val="accent1"/>
+          </a:fillRef>
+          <a:effectRef idx="0">
+            <a:schemeClr val="accent1"/>
+          </a:effectRef>
+          <a:fontRef idx="minor">
+            <a:schemeClr val="lt1"/>
+          </a:fontRef>
+        </p:style>
+      </p:sp>
+    </p:spTree>
+  </p:cSld>
+  <p:clrMapOvr>
+    <a:masterClrMapping/>
+  </p:clrMapOvr>
+  <mc:AlternateContent xmlns:mc="http://schemas.openxmlformats.org/markup-compatibility/2006">
+    <mc:Choice xmlns:p159="http://schemas.microsoft.com/office/powerpoint/2015/09/main" xmlns:p14="http://schemas.microsoft.com/office/powerpoint/2010/main" Requires="p159">
+      <p:transition p14:dur="2000" advClick="1"/>
+    </mc:Choice>
+    <mc:Fallback>
+      <p:transition advClick="1"/>
+    </mc:Fallback>
+  </mc:AlternateContent>
+</p:sld>
+</file>
+
+<file path=ppt/slides/slide16.xml><?xml version="1.0" encoding="utf-8"?>
+<p:sld xmlns:a="http://schemas.openxmlformats.org/drawingml/2006/main" xmlns:r="http://schemas.openxmlformats.org/officeDocument/2006/relationships" xmlns:p="http://schemas.openxmlformats.org/presentationml/2006/main" xmlns:m="http://schemas.openxmlformats.org/officeDocument/2006/math" xmlns:w="http://schemas.openxmlformats.org/wordprocessingml/2006/main" xmlns:mc="http://schemas.openxmlformats.org/markup-compatibility/2006" showMasterPhAnim="0" showMasterSp="1" show="1">
+  <p:cSld name="">
+    <p:spTree>
+      <p:nvGrpSpPr>
+        <p:cNvPr id="1" name=""/>
+        <p:cNvGrpSpPr/>
+        <p:nvPr/>
+      </p:nvGrpSpPr>
+      <p:grpSpPr bwMode="auto">
+        <a:xfrm>
+          <a:off x="0" y="0"/>
+          <a:ext cx="0" cy="0"/>
+          <a:chOff x="0" y="0"/>
+          <a:chExt cx="0" cy="0"/>
+        </a:xfrm>
+      </p:grpSpPr>
+      <p:sp>
+        <p:nvSpPr>
+          <p:cNvPr id="594793310" name="Title 1"/>
+          <p:cNvSpPr>
+            <a:spLocks noGrp="1"/>
+          </p:cNvSpPr>
+          <p:nvPr>
+            <p:ph type="title"/>
+          </p:nvPr>
+        </p:nvSpPr>
+        <p:spPr bwMode="auto"/>
+        <p:txBody>
+          <a:bodyPr/>
+          <a:lstStyle/>
+          <a:p>
+            <a:pPr>
+              <a:defRPr/>
+            </a:pPr>
+            <a:r>
+              <a:rPr/>
+              <a:t>3 factors show significant (linear) effect</a:t>
+            </a:r>
+            <a:endParaRPr/>
+          </a:p>
+        </p:txBody>
+      </p:sp>
+      <p:pic>
+        <p:nvPicPr>
+          <p:cNvPr id="855637650" name=""/>
+          <p:cNvPicPr>
+            <a:picLocks noChangeAspect="1"/>
+          </p:cNvPicPr>
+          <p:nvPr/>
+        </p:nvPicPr>
+        <p:blipFill>
+          <a:blip r:embed="rId3"/>
+          <a:stretch/>
+        </p:blipFill>
+        <p:spPr bwMode="auto">
+          <a:xfrm flipH="0" flipV="0">
+            <a:off x="5451499" y="1740958"/>
+            <a:ext cx="6683747" cy="4143471"/>
+          </a:xfrm>
+          <a:prstGeom prst="rect">
+            <a:avLst/>
+          </a:prstGeom>
+        </p:spPr>
+      </p:pic>
+      <p:sp>
+        <p:nvSpPr>
+          <p:cNvPr id="378065073" name="Content Placeholder 2"/>
+          <p:cNvSpPr>
+            <a:spLocks noGrp="1"/>
+          </p:cNvSpPr>
+          <p:nvPr>
+            <p:ph idx="1"/>
+          </p:nvPr>
+        </p:nvSpPr>
+        <p:spPr bwMode="auto">
+          <a:xfrm flipH="0" flipV="0">
+            <a:off x="457199" y="1825624"/>
+            <a:ext cx="5745716" cy="4351338"/>
+          </a:xfrm>
+        </p:spPr>
+        <p:txBody>
+          <a:bodyPr/>
+          <a:lstStyle/>
+          <a:p>
+            <a:pPr>
+              <a:defRPr/>
+            </a:pPr>
+            <a:r>
+              <a:rPr sz="2600"/>
+              <a:t>All 3 quick logical:</a:t>
+            </a:r>
+            <a:endParaRPr sz="2600"/>
+          </a:p>
+          <a:p>
+            <a:pPr lvl="1">
+              <a:defRPr/>
+            </a:pPr>
+            <a:r>
+              <a:rPr sz="2200"/>
+              <a:t>Dedication</a:t>
+            </a:r>
+            <a:endParaRPr sz="2600"/>
+          </a:p>
+          <a:p>
+            <a:pPr lvl="2">
+              <a:defRPr/>
+            </a:pPr>
+            <a:r>
+              <a:rPr sz="1800"/>
+              <a:t>Better tracking =&gt; quicker pregnant</a:t>
+            </a:r>
+            <a:endParaRPr sz="2200"/>
+          </a:p>
+          <a:p>
+            <a:pPr lvl="1">
+              <a:defRPr/>
+            </a:pPr>
+            <a:r>
+              <a:rPr sz="2200"/>
+              <a:t>Intercourse frequency</a:t>
+            </a:r>
+            <a:endParaRPr sz="2600"/>
+          </a:p>
+          <a:p>
+            <a:pPr lvl="2">
+              <a:defRPr/>
+            </a:pPr>
+            <a:r>
+              <a:rPr sz="1800"/>
+              <a:t>Regular intercourse =&gt; quicker pregnant</a:t>
+            </a:r>
+            <a:endParaRPr sz="2200"/>
+          </a:p>
+          <a:p>
+            <a:pPr lvl="1">
+              <a:defRPr/>
+            </a:pPr>
+            <a:r>
+              <a:rPr sz="2200"/>
+              <a:t>Age</a:t>
+            </a:r>
+            <a:endParaRPr sz="2600"/>
+          </a:p>
+          <a:p>
+            <a:pPr lvl="2">
+              <a:defRPr/>
+            </a:pPr>
+            <a:r>
+              <a:rPr sz="1800"/>
+              <a:t>Younger =&gt; more fertile =&gt; quicker pregnant</a:t>
+            </a:r>
+            <a:endParaRPr/>
+          </a:p>
+        </p:txBody>
+      </p:sp>
+    </p:spTree>
+  </p:cSld>
+  <p:clrMapOvr>
+    <a:masterClrMapping/>
+  </p:clrMapOvr>
+  <mc:AlternateContent xmlns:mc="http://schemas.openxmlformats.org/markup-compatibility/2006">
+    <mc:Choice xmlns:p159="http://schemas.microsoft.com/office/powerpoint/2015/09/main" xmlns:p14="http://schemas.microsoft.com/office/powerpoint/2010/main" Requires="p159">
+      <p:transition p14:dur="2000" advClick="1"/>
+    </mc:Choice>
+    <mc:Fallback>
+      <p:transition advClick="1"/>
+    </mc:Fallback>
+  </mc:AlternateContent>
+</p:sld>
+</file>
+
+<file path=ppt/slides/slide17.xml><?xml version="1.0" encoding="utf-8"?>
+<p:sld xmlns:a="http://schemas.openxmlformats.org/drawingml/2006/main" xmlns:r="http://schemas.openxmlformats.org/officeDocument/2006/relationships" xmlns:p="http://schemas.openxmlformats.org/presentationml/2006/main" xmlns:m="http://schemas.openxmlformats.org/officeDocument/2006/math" xmlns:w="http://schemas.openxmlformats.org/wordprocessingml/2006/main" xmlns:mc="http://schemas.openxmlformats.org/markup-compatibility/2006" showMasterPhAnim="0" showMasterSp="1" show="1">
+  <p:cSld name="">
+    <p:spTree>
+      <p:nvGrpSpPr>
+        <p:cNvPr id="1" name=""/>
+        <p:cNvGrpSpPr/>
+        <p:nvPr/>
+      </p:nvGrpSpPr>
+      <p:grpSpPr bwMode="auto">
+        <a:xfrm>
+          <a:off x="0" y="0"/>
+          <a:ext cx="0" cy="0"/>
+          <a:chOff x="0" y="0"/>
+          <a:chExt cx="0" cy="0"/>
+        </a:xfrm>
+      </p:grpSpPr>
+      <p:sp>
+        <p:nvSpPr>
+          <p:cNvPr id="578873782" name="Title 1"/>
+          <p:cNvSpPr>
+            <a:spLocks noGrp="1"/>
+          </p:cNvSpPr>
+          <p:nvPr>
+            <p:ph type="title"/>
+          </p:nvPr>
+        </p:nvSpPr>
+        <p:spPr bwMode="auto">
+          <a:xfrm>
+            <a:off x="838199" y="219092"/>
+            <a:ext cx="10515600" cy="1325562"/>
+          </a:xfrm>
+        </p:spPr>
+        <p:txBody>
+          <a:bodyPr vertOverflow="overflow" horzOverflow="overflow" vert="horz" wrap="square" lIns="91440" tIns="45720" rIns="91440" bIns="45720" numCol="1" spcCol="0" rtlCol="0" fromWordArt="0" anchor="ctr" anchorCtr="0" forceAA="0" upright="0" compatLnSpc="0">
+            <a:normAutofit/>
+          </a:bodyPr>
+          <a:lstStyle/>
+          <a:p>
+            <a:pPr>
+              <a:defRPr/>
+            </a:pPr>
+            <a:r>
+              <a:rPr/>
+              <a:t>Note! Also non-linear effects visible</a:t>
+            </a:r>
+            <a:br>
+              <a:rPr/>
+            </a:br>
+            <a:r>
+              <a:rPr lang="en-GB" sz="2800" b="0" i="0" u="none" strike="noStrike" cap="none" spc="0">
+                <a:solidFill>
+                  <a:schemeClr val="tx1"/>
+                </a:solidFill>
+                <a:latin typeface="+mj-lt"/>
+                <a:ea typeface="+mj-ea"/>
+                <a:cs typeface="+mj-cs"/>
+              </a:rPr>
+              <a:t>Limitation of this analysis =&gt; More advanced modelling needed?</a:t>
+            </a:r>
+            <a:endParaRPr sz="4400"/>
+          </a:p>
+        </p:txBody>
+      </p:sp>
+      <p:pic>
+        <p:nvPicPr>
+          <p:cNvPr id="252945293" name=""/>
+          <p:cNvPicPr>
+            <a:picLocks noChangeAspect="1"/>
+          </p:cNvPicPr>
+          <p:nvPr/>
+        </p:nvPicPr>
+        <p:blipFill>
+          <a:blip r:embed="rId3"/>
+          <a:stretch/>
+        </p:blipFill>
+        <p:spPr bwMode="auto">
+          <a:xfrm flipH="0" flipV="0">
+            <a:off x="1535666" y="1390005"/>
+            <a:ext cx="9048749" cy="5509386"/>
+          </a:xfrm>
+          <a:prstGeom prst="rect">
+            <a:avLst/>
+          </a:prstGeom>
+        </p:spPr>
+      </p:pic>
+      <p:grpSp>
+        <p:nvGrpSpPr>
+          <p:cNvPr id="2124178468" name=""/>
+          <p:cNvGrpSpPr/>
+          <p:nvPr/>
+        </p:nvGrpSpPr>
+        <p:grpSpPr bwMode="auto">
+          <a:xfrm>
+            <a:off x="4426049" y="1630800"/>
+            <a:ext cx="5914916" cy="3461349"/>
+            <a:chOff x="0" y="0"/>
+            <a:chExt cx="5914916" cy="3461349"/>
+          </a:xfrm>
+        </p:grpSpPr>
+        <p:sp>
+          <p:nvSpPr>
+            <p:cNvPr id="1834750762" name=""/>
+            <p:cNvSpPr/>
+            <p:nvPr/>
+          </p:nvSpPr>
+          <p:spPr bwMode="auto">
+            <a:xfrm rot="0" flipH="0" flipV="0">
+              <a:off x="2177566" y="0"/>
+              <a:ext cx="1280583" cy="476249"/>
+            </a:xfrm>
+            <a:custGeom>
+              <a:avLst/>
+              <a:gdLst/>
+              <a:ahLst/>
+              <a:cxnLst/>
+              <a:rect l="l" t="t" r="r" b="b"/>
+              <a:pathLst>
+                <a:path w="43200" h="43200" fill="none" stroke="1" extrusionOk="0">
+                  <a:moveTo>
+                    <a:pt x="0" y="0"/>
+                  </a:moveTo>
+                  <a:cubicBezTo>
+                    <a:pt x="1071" y="2879"/>
+                    <a:pt x="2499" y="4799"/>
+                    <a:pt x="3570" y="7679"/>
+                  </a:cubicBezTo>
+                  <a:cubicBezTo>
+                    <a:pt x="4641" y="9600"/>
+                    <a:pt x="6069" y="11520"/>
+                    <a:pt x="7497" y="14400"/>
+                  </a:cubicBezTo>
+                  <a:cubicBezTo>
+                    <a:pt x="9282" y="17279"/>
+                    <a:pt x="10710" y="19199"/>
+                    <a:pt x="12138" y="21119"/>
+                  </a:cubicBezTo>
+                  <a:cubicBezTo>
+                    <a:pt x="13566" y="24000"/>
+                    <a:pt x="14995" y="25920"/>
+                    <a:pt x="16423" y="27840"/>
+                  </a:cubicBezTo>
+                  <a:cubicBezTo>
+                    <a:pt x="17851" y="29760"/>
+                    <a:pt x="19279" y="31679"/>
+                    <a:pt x="20707" y="33599"/>
+                  </a:cubicBezTo>
+                  <a:cubicBezTo>
+                    <a:pt x="22135" y="35519"/>
+                    <a:pt x="23563" y="36480"/>
+                    <a:pt x="24991" y="37440"/>
+                  </a:cubicBezTo>
+                  <a:cubicBezTo>
+                    <a:pt x="26419" y="39360"/>
+                    <a:pt x="27490" y="41280"/>
+                    <a:pt x="28919" y="42240"/>
+                  </a:cubicBezTo>
+                  <a:cubicBezTo>
+                    <a:pt x="30347" y="43200"/>
+                    <a:pt x="31775" y="43200"/>
+                    <a:pt x="33203" y="42240"/>
+                  </a:cubicBezTo>
+                  <a:cubicBezTo>
+                    <a:pt x="34274" y="40320"/>
+                    <a:pt x="35702" y="39360"/>
+                    <a:pt x="37130" y="37440"/>
+                  </a:cubicBezTo>
+                  <a:cubicBezTo>
+                    <a:pt x="38558" y="35519"/>
+                    <a:pt x="39986" y="34559"/>
+                    <a:pt x="41057" y="32639"/>
+                  </a:cubicBezTo>
+                  <a:quadBezTo>
+                    <a:pt x="42128" y="30719"/>
+                    <a:pt x="43200" y="28800"/>
+                  </a:quadBezTo>
+                </a:path>
+              </a:pathLst>
+            </a:custGeom>
+            <a:ln w="57150" cap="flat" cmpd="sng" algn="ctr">
+              <a:solidFill>
+                <a:srgbClr val="FF0000"/>
+              </a:solidFill>
+              <a:prstDash val="solid"/>
+              <a:miter lim="800000"/>
+              <a:tailEnd type="triangle"/>
+            </a:ln>
+          </p:spPr>
+          <p:style>
+            <a:lnRef idx="2">
+              <a:schemeClr val="accent1">
+                <a:shade val="50000"/>
+              </a:schemeClr>
+            </a:lnRef>
+            <a:fillRef idx="1">
+              <a:schemeClr val="accent1"/>
+            </a:fillRef>
+            <a:effectRef idx="0">
+              <a:schemeClr val="accent1"/>
+            </a:effectRef>
+            <a:fontRef idx="minor">
+              <a:schemeClr val="lt1"/>
+            </a:fontRef>
+          </p:style>
+        </p:sp>
+        <p:sp>
+          <p:nvSpPr>
+            <p:cNvPr id="1604712070" name=""/>
+            <p:cNvSpPr/>
+            <p:nvPr/>
+          </p:nvSpPr>
+          <p:spPr bwMode="auto">
+            <a:xfrm rot="0" flipH="0" flipV="0">
+              <a:off x="4464999" y="2752266"/>
+              <a:ext cx="1449916" cy="709083"/>
+            </a:xfrm>
+            <a:custGeom>
+              <a:avLst/>
+              <a:gdLst/>
+              <a:ahLst/>
+              <a:cxnLst/>
+              <a:rect l="l" t="t" r="r" b="b"/>
+              <a:pathLst>
+                <a:path w="43200" h="43200" fill="none" stroke="1" extrusionOk="0">
+                  <a:moveTo>
+                    <a:pt x="315" y="43200"/>
+                  </a:moveTo>
+                  <a:cubicBezTo>
+                    <a:pt x="0" y="40620"/>
+                    <a:pt x="0" y="38041"/>
+                    <a:pt x="0" y="35462"/>
+                  </a:cubicBezTo>
+                  <a:cubicBezTo>
+                    <a:pt x="0" y="32883"/>
+                    <a:pt x="315" y="29659"/>
+                    <a:pt x="630" y="27080"/>
+                  </a:cubicBezTo>
+                  <a:cubicBezTo>
+                    <a:pt x="1261" y="25146"/>
+                    <a:pt x="1891" y="23211"/>
+                    <a:pt x="2522" y="21277"/>
+                  </a:cubicBezTo>
+                  <a:cubicBezTo>
+                    <a:pt x="3153" y="18698"/>
+                    <a:pt x="3783" y="16764"/>
+                    <a:pt x="4729" y="14829"/>
+                  </a:cubicBezTo>
+                  <a:cubicBezTo>
+                    <a:pt x="5675" y="13540"/>
+                    <a:pt x="6621" y="11605"/>
+                    <a:pt x="7567" y="10316"/>
+                  </a:cubicBezTo>
+                  <a:cubicBezTo>
+                    <a:pt x="8513" y="9026"/>
+                    <a:pt x="10090" y="7737"/>
+                    <a:pt x="11667" y="6447"/>
+                  </a:cubicBezTo>
+                  <a:cubicBezTo>
+                    <a:pt x="12928" y="5802"/>
+                    <a:pt x="14189" y="5158"/>
+                    <a:pt x="15451" y="3868"/>
+                  </a:cubicBezTo>
+                  <a:cubicBezTo>
+                    <a:pt x="17027" y="3223"/>
+                    <a:pt x="18289" y="2579"/>
+                    <a:pt x="20181" y="1934"/>
+                  </a:cubicBezTo>
+                  <a:cubicBezTo>
+                    <a:pt x="21757" y="1934"/>
+                    <a:pt x="23334" y="644"/>
+                    <a:pt x="24595" y="644"/>
+                  </a:cubicBezTo>
+                  <a:cubicBezTo>
+                    <a:pt x="25856" y="0"/>
+                    <a:pt x="27748" y="0"/>
+                    <a:pt x="29640" y="0"/>
+                  </a:cubicBezTo>
+                  <a:cubicBezTo>
+                    <a:pt x="31532" y="0"/>
+                    <a:pt x="32794" y="0"/>
+                    <a:pt x="34055" y="0"/>
+                  </a:cubicBezTo>
+                  <a:cubicBezTo>
+                    <a:pt x="36578" y="0"/>
+                    <a:pt x="38785" y="644"/>
+                    <a:pt x="40677" y="644"/>
+                  </a:cubicBezTo>
+                  <a:quadBezTo>
+                    <a:pt x="41938" y="1289"/>
+                    <a:pt x="43200" y="1289"/>
+                  </a:quadBezTo>
+                </a:path>
+              </a:pathLst>
+            </a:custGeom>
+            <a:ln w="57150" cap="flat" cmpd="sng" algn="ctr">
+              <a:solidFill>
+                <a:srgbClr val="FF0000"/>
+              </a:solidFill>
+              <a:prstDash val="solid"/>
+              <a:miter lim="800000"/>
+              <a:tailEnd type="triangle"/>
+            </a:ln>
+          </p:spPr>
+          <p:style>
+            <a:lnRef idx="2">
+              <a:schemeClr val="accent1">
+                <a:shade val="50000"/>
+              </a:schemeClr>
+            </a:lnRef>
+            <a:fillRef idx="1">
+              <a:schemeClr val="accent1"/>
+            </a:fillRef>
+            <a:effectRef idx="0">
+              <a:schemeClr val="accent1"/>
+            </a:effectRef>
+            <a:fontRef idx="minor">
+              <a:schemeClr val="lt1"/>
+            </a:fontRef>
+          </p:style>
+        </p:sp>
+        <p:sp>
+          <p:nvSpPr>
+            <p:cNvPr id="151207450" name=""/>
+            <p:cNvSpPr/>
+            <p:nvPr/>
+          </p:nvSpPr>
+          <p:spPr bwMode="auto">
+            <a:xfrm rot="0" flipH="0" flipV="0">
+              <a:off x="0" y="0"/>
+              <a:ext cx="1195916" cy="433916"/>
+            </a:xfrm>
+            <a:custGeom>
+              <a:avLst/>
+              <a:gdLst/>
+              <a:ahLst/>
+              <a:cxnLst/>
+              <a:rect l="l" t="t" r="r" b="b"/>
+              <a:pathLst>
+                <a:path w="43200" h="43200" fill="none" stroke="1" extrusionOk="0">
+                  <a:moveTo>
+                    <a:pt x="0" y="0"/>
+                  </a:moveTo>
+                  <a:cubicBezTo>
+                    <a:pt x="1146" y="2107"/>
+                    <a:pt x="1911" y="5268"/>
+                    <a:pt x="2676" y="8429"/>
+                  </a:cubicBezTo>
+                  <a:cubicBezTo>
+                    <a:pt x="3440" y="12643"/>
+                    <a:pt x="4587" y="16858"/>
+                    <a:pt x="5352" y="20019"/>
+                  </a:cubicBezTo>
+                  <a:cubicBezTo>
+                    <a:pt x="6116" y="23180"/>
+                    <a:pt x="7263" y="26341"/>
+                    <a:pt x="8410" y="28448"/>
+                  </a:cubicBezTo>
+                  <a:cubicBezTo>
+                    <a:pt x="9939" y="31609"/>
+                    <a:pt x="11851" y="34770"/>
+                    <a:pt x="13380" y="35824"/>
+                  </a:cubicBezTo>
+                  <a:cubicBezTo>
+                    <a:pt x="14527" y="37931"/>
+                    <a:pt x="16438" y="40039"/>
+                    <a:pt x="17968" y="42146"/>
+                  </a:cubicBezTo>
+                  <a:cubicBezTo>
+                    <a:pt x="19497" y="43200"/>
+                    <a:pt x="21026" y="43200"/>
+                    <a:pt x="22555" y="43200"/>
+                  </a:cubicBezTo>
+                  <a:cubicBezTo>
+                    <a:pt x="24849" y="43200"/>
+                    <a:pt x="27143" y="43200"/>
+                    <a:pt x="29819" y="42146"/>
+                  </a:cubicBezTo>
+                  <a:cubicBezTo>
+                    <a:pt x="31348" y="41092"/>
+                    <a:pt x="32877" y="38985"/>
+                    <a:pt x="34024" y="36878"/>
+                  </a:cubicBezTo>
+                  <a:cubicBezTo>
+                    <a:pt x="35171" y="34770"/>
+                    <a:pt x="36318" y="31609"/>
+                    <a:pt x="37847" y="27395"/>
+                  </a:cubicBezTo>
+                  <a:cubicBezTo>
+                    <a:pt x="38994" y="25287"/>
+                    <a:pt x="40523" y="23180"/>
+                    <a:pt x="42053" y="20019"/>
+                  </a:cubicBezTo>
+                  <a:lnTo>
+                    <a:pt x="43200" y="17912"/>
+                  </a:lnTo>
+                </a:path>
+              </a:pathLst>
+            </a:custGeom>
+            <a:ln w="57150" cap="flat" cmpd="sng" algn="ctr">
+              <a:solidFill>
+                <a:srgbClr val="FF0000"/>
+              </a:solidFill>
+              <a:prstDash val="solid"/>
+              <a:miter lim="800000"/>
+              <a:tailEnd type="triangle"/>
+            </a:ln>
+          </p:spPr>
+          <p:style>
+            <a:lnRef idx="2">
+              <a:schemeClr val="accent1">
+                <a:shade val="50000"/>
+              </a:schemeClr>
+            </a:lnRef>
+            <a:fillRef idx="1">
+              <a:schemeClr val="accent1"/>
+            </a:fillRef>
+            <a:effectRef idx="0">
+              <a:schemeClr val="accent1"/>
+            </a:effectRef>
+            <a:fontRef idx="minor">
+              <a:schemeClr val="lt1"/>
+            </a:fontRef>
+          </p:style>
+        </p:sp>
+      </p:grpSp>
+    </p:spTree>
+  </p:cSld>
+  <p:clrMapOvr>
+    <a:masterClrMapping/>
+  </p:clrMapOvr>
+  <mc:AlternateContent xmlns:mc="http://schemas.openxmlformats.org/markup-compatibility/2006">
+    <mc:Choice xmlns:p159="http://schemas.microsoft.com/office/powerpoint/2015/09/main" xmlns:p14="http://schemas.microsoft.com/office/powerpoint/2010/main" Requires="p159">
+      <p:transition p14:dur="2000" advClick="1"/>
+    </mc:Choice>
+    <mc:Fallback>
+      <p:transition advClick="1"/>
+    </mc:Fallback>
+  </mc:AlternateContent>
+</p:sld>
+</file>
+
+<file path=ppt/slides/slide18.xml><?xml version="1.0" encoding="utf-8"?>
+<p:sld xmlns:a="http://schemas.openxmlformats.org/drawingml/2006/main" xmlns:r="http://schemas.openxmlformats.org/officeDocument/2006/relationships" xmlns:p="http://schemas.openxmlformats.org/presentationml/2006/main" xmlns:m="http://schemas.openxmlformats.org/officeDocument/2006/math" xmlns:w="http://schemas.openxmlformats.org/wordprocessingml/2006/main" xmlns:mc="http://schemas.openxmlformats.org/markup-compatibility/2006" showMasterPhAnim="0" showMasterSp="1" show="1">
+  <p:cSld name="">
+    <p:spTree>
+      <p:nvGrpSpPr>
+        <p:cNvPr id="1" name=""/>
+        <p:cNvGrpSpPr/>
+        <p:nvPr/>
+      </p:nvGrpSpPr>
+      <p:grpSpPr bwMode="auto">
+        <a:xfrm>
+          <a:off x="0" y="0"/>
+          <a:ext cx="0" cy="0"/>
+          <a:chOff x="0" y="0"/>
+          <a:chExt cx="0" cy="0"/>
+        </a:xfrm>
+      </p:grpSpPr>
+      <p:sp>
+        <p:nvSpPr>
           <p:cNvPr id="1169009206" name="Title 1"/>
           <p:cNvSpPr>
             <a:spLocks noGrp="1"/>
@@ -6454,14 +8006,16 @@
         </p:nvSpPr>
         <p:spPr bwMode="auto"/>
         <p:txBody>
-          <a:bodyPr/>
-          <a:lstStyle/>
-          <a:p>
-            <a:pPr>
-              <a:defRPr/>
-            </a:pPr>
-            <a:r>
-              <a:rPr lang="en-GB" sz="2800" b="0" i="0" u="none" strike="noStrike" cap="none" spc="0">
+          <a:bodyPr vertOverflow="overflow" horzOverflow="overflow" vert="horz" wrap="square" lIns="91440" tIns="45720" rIns="91440" bIns="45720" numCol="1" spcCol="0" rtlCol="0" fromWordArt="0" anchor="t" anchorCtr="0" forceAA="0" upright="0" compatLnSpc="0">
+            <a:normAutofit/>
+          </a:bodyPr>
+          <a:lstStyle/>
+          <a:p>
+            <a:pPr>
+              <a:defRPr/>
+            </a:pPr>
+            <a:r>
+              <a:rPr lang="en-GB" sz="2700" b="0" i="0" u="none" strike="noStrike" cap="none" spc="0">
                 <a:solidFill>
                   <a:schemeClr val="tx1"/>
                 </a:solidFill>
@@ -6471,36 +8025,20 @@
               </a:rPr>
               <a:t>Two approaches:</a:t>
             </a:r>
-            <a:endParaRPr sz="2800"/>
+            <a:endParaRPr lang="en-GB" sz="2700" b="0" i="0" u="none" strike="noStrike" cap="none" spc="0">
+              <a:solidFill>
+                <a:schemeClr val="tx1"/>
+              </a:solidFill>
+              <a:latin typeface="Times New Roman"/>
+              <a:cs typeface="Times New Roman"/>
+            </a:endParaRPr>
           </a:p>
           <a:p>
             <a:pPr lvl="1">
               <a:defRPr/>
             </a:pPr>
             <a:r>
-              <a:rPr lang="en-GB" sz="2800" b="0" i="0" u="none" strike="noStrike" cap="none" spc="0">
-                <a:solidFill>
-                  <a:schemeClr val="tx1"/>
-                </a:solidFill>
-                <a:latin typeface="+mn-lt"/>
-                <a:ea typeface="+mn-ea"/>
-                <a:cs typeface="+mn-cs"/>
-              </a:rPr>
-              <a:t>Non-ML </a:t>
-            </a:r>
-            <a:r>
-              <a:rPr lang="en-GB" sz="2800" b="0" i="0" u="none" strike="noStrike" cap="none" spc="0">
-                <a:solidFill>
-                  <a:schemeClr val="tx1"/>
-                </a:solidFill>
-                <a:latin typeface="+mn-lt"/>
-                <a:ea typeface="+mn-ea"/>
-                <a:cs typeface="+mn-cs"/>
-              </a:rPr>
-              <a:t>   </a:t>
-            </a:r>
-            <a:r>
-              <a:rPr lang="en-GB" sz="2800" b="0" i="0" u="none" strike="noStrike" cap="none" spc="0">
+              <a:rPr lang="en-GB" sz="2300" b="0" i="0" u="none" strike="noStrike" cap="none" spc="0">
                 <a:solidFill>
                   <a:schemeClr val="tx1"/>
                 </a:solidFill>
@@ -6508,22 +8046,28 @@
                 <a:ea typeface="Arial"/>
                 <a:cs typeface="Arial"/>
               </a:rPr>
-              <a:t> </a:t>
-            </a:r>
-            <a:endParaRPr sz="2800"/>
+              <a:t>Non-ML</a:t>
+            </a:r>
+            <a:endParaRPr lang="en-GB" sz="2300" b="0" i="0" u="none" strike="noStrike" cap="none" spc="0">
+              <a:solidFill>
+                <a:schemeClr val="tx1"/>
+              </a:solidFill>
+              <a:latin typeface="Times New Roman"/>
+              <a:cs typeface="Times New Roman"/>
+            </a:endParaRPr>
           </a:p>
           <a:p>
             <a:pPr lvl="1">
               <a:defRPr/>
             </a:pPr>
-            <a:endParaRPr sz="2800"/>
-          </a:p>
-          <a:p>
-            <a:pPr lvl="0">
-              <a:defRPr/>
-            </a:pPr>
-            <a:r>
-              <a:rPr lang="en-GB" sz="2400" b="1" i="0" u="none" strike="noStrike" cap="none" spc="0">
+            <a:endParaRPr lang="en-GB" sz="2700"/>
+          </a:p>
+          <a:p>
+            <a:pPr lvl="1">
+              <a:defRPr/>
+            </a:pPr>
+            <a:r>
+              <a:rPr lang="en-GB" sz="2300" b="1" i="0" u="sng" strike="noStrike" cap="none" spc="0">
                 <a:solidFill>
                   <a:schemeClr val="tx1"/>
                 </a:solidFill>
@@ -6533,7 +8077,7 @@
               </a:rPr>
               <a:t>ML:</a:t>
             </a:r>
-            <a:endParaRPr lang="en-GB" sz="2400" b="1" i="0" u="none" strike="noStrike" cap="none" spc="0">
+            <a:endParaRPr lang="en-GB" sz="2300" b="0" i="0" u="none" strike="noStrike" cap="none" spc="0">
               <a:solidFill>
                 <a:schemeClr val="tx1"/>
               </a:solidFill>
@@ -6545,13 +8089,7 @@
             <a:pPr lvl="0">
               <a:defRPr/>
             </a:pPr>
-            <a:endParaRPr sz="2400"/>
-          </a:p>
-          <a:p>
-            <a:pPr lvl="0">
-              <a:defRPr/>
-            </a:pPr>
-            <a:endParaRPr lang="en-GB" sz="2400" b="1" i="0" u="none" strike="noStrike" cap="none" spc="0">
+            <a:endParaRPr sz="2700" b="1" i="0" u="none" strike="noStrike" cap="none" spc="0">
               <a:solidFill>
                 <a:schemeClr val="tx1"/>
               </a:solidFill>
@@ -6563,8 +8101,14 @@
             <a:pPr lvl="0">
               <a:defRPr/>
             </a:pPr>
-            <a:r>
-              <a:rPr lang="en-GB" sz="2400" b="1" i="0" u="none" strike="noStrike" cap="none" spc="0">
+            <a:endParaRPr sz="2700"/>
+          </a:p>
+          <a:p>
+            <a:pPr lvl="0">
+              <a:defRPr/>
+            </a:pPr>
+            <a:r>
+              <a:rPr lang="en-GB" sz="2700" b="1" i="0" u="none" strike="noStrike" cap="none" spc="0">
                 <a:solidFill>
                   <a:schemeClr val="tx1"/>
                 </a:solidFill>
@@ -6574,7 +8118,7 @@
               </a:rPr>
               <a:t>Why?</a:t>
             </a:r>
-            <a:endParaRPr lang="en-GB" sz="2400" b="1" i="0" u="none" strike="noStrike" cap="none" spc="0">
+            <a:endParaRPr lang="en-GB" sz="2700" b="1" i="0" u="none" strike="noStrike" cap="none" spc="0">
               <a:solidFill>
                 <a:schemeClr val="tx1"/>
               </a:solidFill>
@@ -6587,30 +8131,7 @@
               <a:defRPr/>
             </a:pPr>
             <a:r>
-              <a:rPr lang="en-GB" sz="2400" b="0" i="0" u="none" strike="noStrike" cap="none" spc="0">
-                <a:solidFill>
-                  <a:schemeClr val="tx1"/>
-                </a:solidFill>
-                <a:latin typeface="+mn-lt"/>
-                <a:ea typeface="+mn-ea"/>
-                <a:cs typeface="+mn-cs"/>
-              </a:rPr>
-              <a:t>Possible to discover complex patterns</a:t>
-            </a:r>
-            <a:endParaRPr lang="en-GB" sz="2400" b="0" i="0" u="none" strike="noStrike" cap="none" spc="0">
-              <a:solidFill>
-                <a:schemeClr val="tx1"/>
-              </a:solidFill>
-              <a:latin typeface="Times New Roman"/>
-              <a:cs typeface="Times New Roman"/>
-            </a:endParaRPr>
-          </a:p>
-          <a:p>
-            <a:pPr lvl="1">
-              <a:defRPr/>
-            </a:pPr>
-            <a:r>
-              <a:rPr lang="en-GB" sz="2400" b="0" i="0" u="none" strike="noStrike" cap="none" spc="0">
+              <a:rPr lang="en-GB" sz="2300" b="0" i="0" u="none" strike="noStrike" cap="none" spc="0">
                 <a:solidFill>
                   <a:schemeClr val="tx1"/>
                 </a:solidFill>
@@ -6618,15 +8139,38 @@
                 <a:ea typeface="Arial"/>
                 <a:cs typeface="Arial"/>
               </a:rPr>
-              <a:t>Gives possibility for (more) accurate predictions</a:t>
-            </a:r>
-            <a:endParaRPr sz="2400"/>
+              <a:t>Easier to to discover complex (non-linear) patterns</a:t>
+            </a:r>
+            <a:endParaRPr lang="en-GB" sz="2300" b="0" i="0" u="none" strike="noStrike" cap="none" spc="0">
+              <a:solidFill>
+                <a:schemeClr val="tx1"/>
+              </a:solidFill>
+              <a:latin typeface="Times New Roman"/>
+              <a:cs typeface="Times New Roman"/>
+            </a:endParaRPr>
           </a:p>
           <a:p>
             <a:pPr lvl="1">
               <a:defRPr/>
             </a:pPr>
-            <a:endParaRPr/>
+            <a:r>
+              <a:rPr lang="en-GB" sz="2300" b="0" i="0" u="none" strike="noStrike" cap="none" spc="0">
+                <a:solidFill>
+                  <a:schemeClr val="tx1"/>
+                </a:solidFill>
+                <a:latin typeface="Arial"/>
+                <a:ea typeface="Arial"/>
+                <a:cs typeface="Arial"/>
+              </a:rPr>
+              <a:t>Potentially could give better predictions</a:t>
+            </a:r>
+            <a:endParaRPr lang="en-GB" sz="2300" b="0" i="0" u="none" strike="noStrike" cap="none" spc="0">
+              <a:solidFill>
+                <a:schemeClr val="tx1"/>
+              </a:solidFill>
+              <a:latin typeface="Times New Roman"/>
+              <a:cs typeface="Times New Roman"/>
+            </a:endParaRPr>
           </a:p>
         </p:txBody>
       </p:sp>
@@ -6645,7 +8189,7 @@
         </p:blipFill>
         <p:spPr bwMode="auto">
           <a:xfrm flipH="0" flipV="0">
-            <a:off x="6018290" y="1924049"/>
+            <a:off x="6272290" y="1825624"/>
             <a:ext cx="2278959" cy="2515716"/>
           </a:xfrm>
           <a:prstGeom prst="rect">
@@ -6661,7 +8205,7 @@
         </p:nvSpPr>
         <p:spPr bwMode="auto">
           <a:xfrm rot="0" flipH="0" flipV="0">
-            <a:off x="3001349" y="3262312"/>
+            <a:off x="3001349" y="3095625"/>
             <a:ext cx="2543175" cy="333373"/>
           </a:xfrm>
           <a:prstGeom prst="rightArrow">
@@ -6687,6 +8231,173 @@
             <a:schemeClr val="lt1"/>
           </a:fontRef>
         </p:style>
+      </p:sp>
+    </p:spTree>
+  </p:cSld>
+  <p:clrMapOvr>
+    <a:masterClrMapping/>
+  </p:clrMapOvr>
+  <mc:AlternateContent xmlns:mc="http://schemas.openxmlformats.org/markup-compatibility/2006">
+    <mc:Choice xmlns:p159="http://schemas.microsoft.com/office/powerpoint/2015/09/main" xmlns:p14="http://schemas.microsoft.com/office/powerpoint/2010/main" Requires="p159">
+      <p:transition p14:dur="2000" advClick="1"/>
+    </mc:Choice>
+    <mc:Fallback>
+      <p:transition advClick="1"/>
+    </mc:Fallback>
+  </mc:AlternateContent>
+</p:sld>
+</file>
+
+<file path=ppt/slides/slide19.xml><?xml version="1.0" encoding="utf-8"?>
+<p:sld xmlns:a="http://schemas.openxmlformats.org/drawingml/2006/main" xmlns:r="http://schemas.openxmlformats.org/officeDocument/2006/relationships" xmlns:p="http://schemas.openxmlformats.org/presentationml/2006/main" xmlns:m="http://schemas.openxmlformats.org/officeDocument/2006/math" xmlns:w="http://schemas.openxmlformats.org/wordprocessingml/2006/main" xmlns:mc="http://schemas.openxmlformats.org/markup-compatibility/2006" showMasterPhAnim="0" showMasterSp="1" show="1">
+  <p:cSld name="">
+    <p:spTree>
+      <p:nvGrpSpPr>
+        <p:cNvPr id="1" name=""/>
+        <p:cNvGrpSpPr/>
+        <p:nvPr/>
+      </p:nvGrpSpPr>
+      <p:grpSpPr bwMode="auto">
+        <a:xfrm>
+          <a:off x="0" y="0"/>
+          <a:ext cx="0" cy="0"/>
+          <a:chOff x="0" y="0"/>
+          <a:chExt cx="0" cy="0"/>
+        </a:xfrm>
+      </p:grpSpPr>
+      <p:sp>
+        <p:nvSpPr>
+          <p:cNvPr id="1526783413" name="Title 1"/>
+          <p:cNvSpPr>
+            <a:spLocks noGrp="1"/>
+          </p:cNvSpPr>
+          <p:nvPr>
+            <p:ph type="title"/>
+          </p:nvPr>
+        </p:nvSpPr>
+        <p:spPr bwMode="auto"/>
+        <p:txBody>
+          <a:bodyPr/>
+          <a:lstStyle/>
+          <a:p>
+            <a:pPr>
+              <a:defRPr/>
+            </a:pPr>
+            <a:r>
+              <a:rPr/>
+              <a:t>Model choice</a:t>
+            </a:r>
+            <a:endParaRPr/>
+          </a:p>
+        </p:txBody>
+      </p:sp>
+      <p:sp>
+        <p:nvSpPr>
+          <p:cNvPr id="639355881" name="Content Placeholder 2"/>
+          <p:cNvSpPr>
+            <a:spLocks noGrp="1"/>
+          </p:cNvSpPr>
+          <p:nvPr>
+            <p:ph idx="1"/>
+          </p:nvPr>
+        </p:nvSpPr>
+        <p:spPr bwMode="auto"/>
+        <p:txBody>
+          <a:bodyPr/>
+          <a:lstStyle/>
+          <a:p>
+            <a:pPr>
+              <a:defRPr/>
+            </a:pPr>
+            <a:r>
+              <a:rPr/>
+              <a:t>When in doubt: </a:t>
+            </a:r>
+            <a:r>
+              <a:rPr b="1"/>
+              <a:t>XGBoost!</a:t>
+            </a:r>
+            <a:endParaRPr/>
+          </a:p>
+          <a:p>
+            <a:pPr lvl="1">
+              <a:lnSpc>
+                <a:spcPct val="114999"/>
+              </a:lnSpc>
+              <a:defRPr/>
+            </a:pPr>
+            <a:r>
+              <a:rPr/>
+              <a:t>Easy implementation</a:t>
+            </a:r>
+            <a:r>
+              <a:rPr/>
+              <a:t> (especially compared to neural networks)</a:t>
+            </a:r>
+            <a:endParaRPr/>
+          </a:p>
+          <a:p>
+            <a:pPr lvl="1">
+              <a:lnSpc>
+                <a:spcPct val="114999"/>
+              </a:lnSpc>
+              <a:defRPr/>
+            </a:pPr>
+            <a:r>
+              <a:rPr/>
+              <a:t>Accepts categorical + numerical data</a:t>
+            </a:r>
+            <a:endParaRPr/>
+          </a:p>
+          <a:p>
+            <a:pPr lvl="1">
+              <a:lnSpc>
+                <a:spcPct val="114999"/>
+              </a:lnSpc>
+              <a:defRPr/>
+            </a:pPr>
+            <a:r>
+              <a:rPr/>
+              <a:t>Allows for classification + regression modeling</a:t>
+            </a:r>
+            <a:endParaRPr/>
+          </a:p>
+          <a:p>
+            <a:pPr lvl="1">
+              <a:lnSpc>
+                <a:spcPct val="114999"/>
+              </a:lnSpc>
+              <a:defRPr/>
+            </a:pPr>
+            <a:r>
+              <a:rPr/>
+              <a:t>Build-in explainability tools (feature importance)</a:t>
+            </a:r>
+            <a:endParaRPr/>
+          </a:p>
+          <a:p>
+            <a:pPr lvl="1">
+              <a:lnSpc>
+                <a:spcPct val="114999"/>
+              </a:lnSpc>
+              <a:defRPr/>
+            </a:pPr>
+            <a:endParaRPr/>
+          </a:p>
+          <a:p>
+            <a:pPr lvl="0">
+              <a:lnSpc>
+                <a:spcPct val="114999"/>
+              </a:lnSpc>
+              <a:defRPr/>
+            </a:pPr>
+            <a:r>
+              <a:rPr/>
+              <a:t>Note: average performance over 5-fold cross validation shown</a:t>
+            </a:r>
+            <a:endParaRPr/>
+          </a:p>
+        </p:txBody>
       </p:sp>
     </p:spTree>
   </p:cSld>
@@ -6925,6 +8636,171 @@
           </a:p>
         </p:txBody>
       </p:sp>
+    </p:spTree>
+  </p:cSld>
+  <p:clrMapOvr>
+    <a:masterClrMapping/>
+  </p:clrMapOvr>
+  <mc:AlternateContent xmlns:mc="http://schemas.openxmlformats.org/markup-compatibility/2006">
+    <mc:Choice xmlns:p159="http://schemas.microsoft.com/office/powerpoint/2015/09/main" xmlns:p14="http://schemas.microsoft.com/office/powerpoint/2010/main" Requires="p159">
+      <p:transition p14:dur="2000" advClick="1"/>
+    </mc:Choice>
+    <mc:Fallback>
+      <p:transition advClick="1"/>
+    </mc:Fallback>
+  </mc:AlternateContent>
+</p:sld>
+</file>
+
+<file path=ppt/slides/slide20.xml><?xml version="1.0" encoding="utf-8"?>
+<p:sld xmlns:a="http://schemas.openxmlformats.org/drawingml/2006/main" xmlns:r="http://schemas.openxmlformats.org/officeDocument/2006/relationships" xmlns:p="http://schemas.openxmlformats.org/presentationml/2006/main" xmlns:m="http://schemas.openxmlformats.org/officeDocument/2006/math" xmlns:w="http://schemas.openxmlformats.org/wordprocessingml/2006/main" xmlns:mc="http://schemas.openxmlformats.org/markup-compatibility/2006" showMasterPhAnim="0" showMasterSp="1" show="1">
+  <p:cSld name="">
+    <p:spTree>
+      <p:nvGrpSpPr>
+        <p:cNvPr id="1" name=""/>
+        <p:cNvGrpSpPr/>
+        <p:nvPr/>
+      </p:nvGrpSpPr>
+      <p:grpSpPr bwMode="auto">
+        <a:xfrm>
+          <a:off x="0" y="0"/>
+          <a:ext cx="0" cy="0"/>
+          <a:chOff x="0" y="0"/>
+          <a:chExt cx="0" cy="0"/>
+        </a:xfrm>
+      </p:grpSpPr>
+      <p:sp>
+        <p:nvSpPr>
+          <p:cNvPr id="559771013" name="Title 1"/>
+          <p:cNvSpPr>
+            <a:spLocks noGrp="1"/>
+          </p:cNvSpPr>
+          <p:nvPr>
+            <p:ph type="title"/>
+          </p:nvPr>
+        </p:nvSpPr>
+        <p:spPr bwMode="auto">
+          <a:xfrm flipH="0" flipV="0">
+            <a:off x="838199" y="365124"/>
+            <a:ext cx="10515600" cy="1105958"/>
+          </a:xfrm>
+        </p:spPr>
+        <p:txBody>
+          <a:bodyPr/>
+          <a:lstStyle/>
+          <a:p>
+            <a:pPr>
+              <a:defRPr/>
+            </a:pPr>
+            <a:r>
+              <a:rPr sz="2800" b="1"/>
+              <a:t>New effects can be observed!</a:t>
+            </a:r>
+            <a:r>
+              <a:rPr sz="2800" b="1"/>
+              <a:t> </a:t>
+            </a:r>
+            <a:r>
+              <a:rPr sz="2800"/>
+              <a:t>(despite poor model performance)</a:t>
+            </a:r>
+            <a:endParaRPr sz="2800"/>
+          </a:p>
+        </p:txBody>
+      </p:sp>
+      <p:sp>
+        <p:nvSpPr>
+          <p:cNvPr id="1966690621" name="Content Placeholder 2"/>
+          <p:cNvSpPr>
+            <a:spLocks noGrp="1"/>
+          </p:cNvSpPr>
+          <p:nvPr>
+            <p:ph idx="1"/>
+          </p:nvPr>
+        </p:nvSpPr>
+        <p:spPr bwMode="auto">
+          <a:xfrm flipH="0" flipV="0">
+            <a:off x="838199" y="1386416"/>
+            <a:ext cx="10515600" cy="963083"/>
+          </a:xfrm>
+        </p:spPr>
+        <p:txBody>
+          <a:bodyPr/>
+          <a:lstStyle/>
+          <a:p>
+            <a:pPr>
+              <a:defRPr/>
+            </a:pPr>
+            <a:r>
+              <a:rPr sz="2400"/>
+              <a:t>Dedication, intercourse frequency and age remain important</a:t>
+            </a:r>
+            <a:r>
+              <a:rPr sz="2400"/>
+              <a:t>!</a:t>
+            </a:r>
+            <a:endParaRPr sz="2400"/>
+          </a:p>
+          <a:p>
+            <a:pPr>
+              <a:defRPr/>
+            </a:pPr>
+            <a:r>
+              <a:rPr sz="2400"/>
+              <a:t>Previous pregnancies, cycle length and BMI, now </a:t>
+            </a:r>
+            <a:r>
+              <a:rPr sz="2400"/>
+              <a:t>show effect</a:t>
+            </a:r>
+            <a:endParaRPr sz="2400"/>
+          </a:p>
+        </p:txBody>
+      </p:sp>
+      <p:pic>
+        <p:nvPicPr>
+          <p:cNvPr id="1534501882" name=""/>
+          <p:cNvPicPr>
+            <a:picLocks noChangeAspect="1"/>
+          </p:cNvPicPr>
+          <p:nvPr/>
+        </p:nvPicPr>
+        <p:blipFill>
+          <a:blip r:embed="rId3"/>
+          <a:stretch/>
+        </p:blipFill>
+        <p:spPr bwMode="auto">
+          <a:xfrm flipH="0" flipV="0">
+            <a:off x="5316226" y="2793999"/>
+            <a:ext cx="6255946" cy="3725332"/>
+          </a:xfrm>
+          <a:prstGeom prst="rect">
+            <a:avLst/>
+          </a:prstGeom>
+        </p:spPr>
+      </p:pic>
+      <p:pic>
+        <p:nvPicPr>
+          <p:cNvPr id="1277377169" name=""/>
+          <p:cNvPicPr>
+            <a:picLocks noChangeAspect="1"/>
+          </p:cNvPicPr>
+          <p:nvPr/>
+        </p:nvPicPr>
+        <p:blipFill>
+          <a:blip r:embed="rId4"/>
+          <a:stretch/>
+        </p:blipFill>
+        <p:spPr bwMode="auto">
+          <a:xfrm flipH="0" flipV="0">
+            <a:off x="981583" y="2455332"/>
+            <a:ext cx="4334643" cy="4328361"/>
+          </a:xfrm>
+          <a:prstGeom prst="rect">
+            <a:avLst/>
+          </a:prstGeom>
+        </p:spPr>
+      </p:pic>
     </p:spTree>
   </p:cSld>
   <p:clrMapOvr>

</xml_diff>